<commit_message>
redwood theme: financial_transactions and student_network figures
</commit_message>
<xml_diff>
--- a/images/example_graphs/financial_transactions.pptx
+++ b/images/example_graphs/financial_transactions.pptx
@@ -243,7 +243,7 @@
           <a:p>
             <a:fld id="{79CD65FD-E9A0-4CA5-8F11-E99658C14B86}" type="datetimeFigureOut">
               <a:rPr lang="en-US" smtClean="0"/>
-              <a:t>1/3/2019</a:t>
+              <a:t>9/29/2019</a:t>
             </a:fld>
             <a:endParaRPr lang="en-US"/>
           </a:p>
@@ -413,7 +413,7 @@
           <a:p>
             <a:fld id="{79CD65FD-E9A0-4CA5-8F11-E99658C14B86}" type="datetimeFigureOut">
               <a:rPr lang="en-US" smtClean="0"/>
-              <a:t>1/3/2019</a:t>
+              <a:t>9/29/2019</a:t>
             </a:fld>
             <a:endParaRPr lang="en-US"/>
           </a:p>
@@ -593,7 +593,7 @@
           <a:p>
             <a:fld id="{79CD65FD-E9A0-4CA5-8F11-E99658C14B86}" type="datetimeFigureOut">
               <a:rPr lang="en-US" smtClean="0"/>
-              <a:t>1/3/2019</a:t>
+              <a:t>9/29/2019</a:t>
             </a:fld>
             <a:endParaRPr lang="en-US"/>
           </a:p>
@@ -763,7 +763,7 @@
           <a:p>
             <a:fld id="{79CD65FD-E9A0-4CA5-8F11-E99658C14B86}" type="datetimeFigureOut">
               <a:rPr lang="en-US" smtClean="0"/>
-              <a:t>1/3/2019</a:t>
+              <a:t>9/29/2019</a:t>
             </a:fld>
             <a:endParaRPr lang="en-US"/>
           </a:p>
@@ -1009,7 +1009,7 @@
           <a:p>
             <a:fld id="{79CD65FD-E9A0-4CA5-8F11-E99658C14B86}" type="datetimeFigureOut">
               <a:rPr lang="en-US" smtClean="0"/>
-              <a:t>1/3/2019</a:t>
+              <a:t>9/29/2019</a:t>
             </a:fld>
             <a:endParaRPr lang="en-US"/>
           </a:p>
@@ -1241,7 +1241,7 @@
           <a:p>
             <a:fld id="{79CD65FD-E9A0-4CA5-8F11-E99658C14B86}" type="datetimeFigureOut">
               <a:rPr lang="en-US" smtClean="0"/>
-              <a:t>1/3/2019</a:t>
+              <a:t>9/29/2019</a:t>
             </a:fld>
             <a:endParaRPr lang="en-US"/>
           </a:p>
@@ -1608,7 +1608,7 @@
           <a:p>
             <a:fld id="{79CD65FD-E9A0-4CA5-8F11-E99658C14B86}" type="datetimeFigureOut">
               <a:rPr lang="en-US" smtClean="0"/>
-              <a:t>1/3/2019</a:t>
+              <a:t>9/29/2019</a:t>
             </a:fld>
             <a:endParaRPr lang="en-US"/>
           </a:p>
@@ -1726,7 +1726,7 @@
           <a:p>
             <a:fld id="{79CD65FD-E9A0-4CA5-8F11-E99658C14B86}" type="datetimeFigureOut">
               <a:rPr lang="en-US" smtClean="0"/>
-              <a:t>1/3/2019</a:t>
+              <a:t>9/29/2019</a:t>
             </a:fld>
             <a:endParaRPr lang="en-US"/>
           </a:p>
@@ -1821,7 +1821,7 @@
           <a:p>
             <a:fld id="{79CD65FD-E9A0-4CA5-8F11-E99658C14B86}" type="datetimeFigureOut">
               <a:rPr lang="en-US" smtClean="0"/>
-              <a:t>1/3/2019</a:t>
+              <a:t>9/29/2019</a:t>
             </a:fld>
             <a:endParaRPr lang="en-US"/>
           </a:p>
@@ -2098,7 +2098,7 @@
           <a:p>
             <a:fld id="{79CD65FD-E9A0-4CA5-8F11-E99658C14B86}" type="datetimeFigureOut">
               <a:rPr lang="en-US" smtClean="0"/>
-              <a:t>1/3/2019</a:t>
+              <a:t>9/29/2019</a:t>
             </a:fld>
             <a:endParaRPr lang="en-US"/>
           </a:p>
@@ -2351,7 +2351,7 @@
           <a:p>
             <a:fld id="{79CD65FD-E9A0-4CA5-8F11-E99658C14B86}" type="datetimeFigureOut">
               <a:rPr lang="en-US" smtClean="0"/>
-              <a:t>1/3/2019</a:t>
+              <a:t>9/29/2019</a:t>
             </a:fld>
             <a:endParaRPr lang="en-US"/>
           </a:p>
@@ -2564,7 +2564,7 @@
           <a:p>
             <a:fld id="{79CD65FD-E9A0-4CA5-8F11-E99658C14B86}" type="datetimeFigureOut">
               <a:rPr lang="en-US" smtClean="0"/>
-              <a:t>1/3/2019</a:t>
+              <a:t>9/29/2019</a:t>
             </a:fld>
             <a:endParaRPr lang="en-US"/>
           </a:p>
@@ -2955,6 +2955,14 @@
 <file path=ppt/slides/slide1.xml><?xml version="1.0" encoding="utf-8"?>
 <p:sld xmlns:a="http://schemas.openxmlformats.org/drawingml/2006/main" xmlns:r="http://schemas.openxmlformats.org/officeDocument/2006/relationships" xmlns:p="http://schemas.openxmlformats.org/presentationml/2006/main">
   <p:cSld>
+    <p:bg>
+      <p:bgPr>
+        <a:solidFill>
+          <a:srgbClr val="312D2A"/>
+        </a:solidFill>
+        <a:effectLst/>
+      </p:bgPr>
+    </p:bg>
     <p:spTree>
       <p:nvGrpSpPr>
         <p:cNvPr id="1" name=""/>
@@ -2993,10 +3001,18 @@
           <a:p>
             <a:pPr algn="ctr"/>
             <a:r>
-              <a:rPr lang="en-US" sz="1200" dirty="0" err="1" smtClean="0"/>
+              <a:rPr lang="en-US" sz="1200" dirty="0" smtClean="0">
+                <a:solidFill>
+                  <a:schemeClr val="bg1"/>
+                </a:solidFill>
+              </a:rPr>
               <a:t>financial_transactions</a:t>
             </a:r>
-            <a:endParaRPr lang="en-US" sz="1200" dirty="0"/>
+            <a:endParaRPr lang="en-US" sz="1200" dirty="0">
+              <a:solidFill>
+                <a:schemeClr val="bg1"/>
+              </a:solidFill>
+            </a:endParaRPr>
           </a:p>
         </p:txBody>
       </p:sp>
@@ -3016,9 +3032,7 @@
           </a:prstGeom>
           <a:ln>
             <a:solidFill>
-              <a:schemeClr val="accent1">
-                <a:lumMod val="75000"/>
-              </a:schemeClr>
+              <a:srgbClr val="41817E"/>
             </a:solidFill>
             <a:tailEnd type="triangle" w="med" len="sm"/>
           </a:ln>
@@ -3057,9 +3071,7 @@
           </a:prstGeom>
           <a:ln>
             <a:solidFill>
-              <a:schemeClr val="accent1">
-                <a:lumMod val="75000"/>
-              </a:schemeClr>
+              <a:srgbClr val="41817E"/>
             </a:solidFill>
             <a:tailEnd type="triangle" w="med" len="sm"/>
           </a:ln>
@@ -3094,9 +3106,7 @@
             <a:avLst/>
           </a:prstGeom>
           <a:solidFill>
-            <a:schemeClr val="bg1">
-              <a:lumMod val="85000"/>
-            </a:schemeClr>
+            <a:srgbClr val="759C6C"/>
           </a:solidFill>
           <a:ln w="6350">
             <a:solidFill>
@@ -3131,20 +3141,14 @@
             <a:r>
               <a:rPr lang="en-US" sz="800" dirty="0" smtClean="0">
                 <a:solidFill>
-                  <a:schemeClr val="tx1">
-                    <a:lumMod val="85000"/>
-                    <a:lumOff val="15000"/>
-                  </a:schemeClr>
+                  <a:schemeClr val="bg1"/>
                 </a:solidFill>
               </a:rPr>
               <a:t>Account</a:t>
             </a:r>
             <a:endParaRPr lang="en-US" sz="800" dirty="0">
               <a:solidFill>
-                <a:schemeClr val="tx1">
-                  <a:lumMod val="85000"/>
-                  <a:lumOff val="15000"/>
-                </a:schemeClr>
+                <a:schemeClr val="bg1"/>
               </a:solidFill>
             </a:endParaRPr>
           </a:p>
@@ -3169,9 +3173,7 @@
           </a:prstGeom>
           <a:ln>
             <a:solidFill>
-              <a:schemeClr val="accent3">
-                <a:lumMod val="75000"/>
-              </a:schemeClr>
+              <a:srgbClr val="759C6C"/>
             </a:solidFill>
             <a:tailEnd type="triangle" w="med" len="sm"/>
           </a:ln>
@@ -3206,10 +3208,7 @@
             <a:avLst/>
           </a:prstGeom>
           <a:solidFill>
-            <a:schemeClr val="accent5">
-              <a:lumMod val="60000"/>
-              <a:lumOff val="40000"/>
-            </a:schemeClr>
+            <a:srgbClr val="41817E"/>
           </a:solidFill>
           <a:ln w="6350">
             <a:solidFill>
@@ -3244,20 +3243,14 @@
             <a:r>
               <a:rPr lang="en-US" sz="800" dirty="0" smtClean="0">
                 <a:solidFill>
-                  <a:schemeClr val="tx1">
-                    <a:lumMod val="85000"/>
-                    <a:lumOff val="15000"/>
-                  </a:schemeClr>
+                  <a:schemeClr val="bg1"/>
                 </a:solidFill>
               </a:rPr>
               <a:t>Person</a:t>
             </a:r>
             <a:endParaRPr lang="en-US" sz="800" dirty="0">
               <a:solidFill>
-                <a:schemeClr val="tx1">
-                  <a:lumMod val="85000"/>
-                  <a:lumOff val="15000"/>
-                </a:schemeClr>
+                <a:schemeClr val="bg1"/>
               </a:solidFill>
             </a:endParaRPr>
           </a:p>
@@ -3278,10 +3271,7 @@
             <a:avLst/>
           </a:prstGeom>
           <a:solidFill>
-            <a:schemeClr val="accent5">
-              <a:lumMod val="60000"/>
-              <a:lumOff val="40000"/>
-            </a:schemeClr>
+            <a:srgbClr val="41817E"/>
           </a:solidFill>
           <a:ln w="6350">
             <a:solidFill>
@@ -3316,20 +3306,14 @@
             <a:r>
               <a:rPr lang="en-US" sz="800" dirty="0" smtClean="0">
                 <a:solidFill>
-                  <a:schemeClr val="tx1">
-                    <a:lumMod val="85000"/>
-                    <a:lumOff val="15000"/>
-                  </a:schemeClr>
+                  <a:schemeClr val="bg1"/>
                 </a:solidFill>
               </a:rPr>
               <a:t>Person</a:t>
             </a:r>
             <a:endParaRPr lang="en-US" sz="800" dirty="0">
               <a:solidFill>
-                <a:schemeClr val="tx1">
-                  <a:lumMod val="85000"/>
-                  <a:lumOff val="15000"/>
-                </a:schemeClr>
+                <a:schemeClr val="bg1"/>
               </a:solidFill>
             </a:endParaRPr>
           </a:p>
@@ -3354,9 +3338,7 @@
           </a:prstGeom>
           <a:ln>
             <a:solidFill>
-              <a:schemeClr val="accent1">
-                <a:lumMod val="75000"/>
-              </a:schemeClr>
+              <a:srgbClr val="41817E"/>
             </a:solidFill>
             <a:tailEnd type="triangle" w="med" len="sm"/>
           </a:ln>
@@ -3395,9 +3377,7 @@
           </a:prstGeom>
           <a:ln>
             <a:solidFill>
-              <a:schemeClr val="accent1">
-                <a:lumMod val="75000"/>
-              </a:schemeClr>
+              <a:srgbClr val="41817E"/>
             </a:solidFill>
             <a:tailEnd type="triangle" w="med" len="sm"/>
           </a:ln>
@@ -3433,9 +3413,7 @@
           </a:prstGeom>
           <a:ln>
             <a:solidFill>
-              <a:schemeClr val="accent3">
-                <a:lumMod val="75000"/>
-              </a:schemeClr>
+              <a:srgbClr val="759C6C"/>
             </a:solidFill>
             <a:tailEnd type="triangle" w="med" len="sm"/>
           </a:ln>
@@ -3471,9 +3449,7 @@
           </a:prstGeom>
           <a:ln>
             <a:solidFill>
-              <a:schemeClr val="accent6">
-                <a:lumMod val="75000"/>
-              </a:schemeClr>
+              <a:srgbClr val="E6AC58"/>
             </a:solidFill>
             <a:tailEnd type="triangle" w="med" len="sm"/>
           </a:ln>
@@ -3508,7 +3484,7 @@
             <a:avLst/>
           </a:prstGeom>
           <a:solidFill>
-            <a:schemeClr val="bg1"/>
+            <a:srgbClr val="312D2A"/>
           </a:solidFill>
         </p:spPr>
         <p:txBody>
@@ -3518,20 +3494,16 @@
           <a:lstStyle/>
           <a:p>
             <a:r>
-              <a:rPr lang="en-US" sz="800" dirty="0" err="1" smtClean="0">
-                <a:solidFill>
-                  <a:schemeClr val="accent6">
-                    <a:lumMod val="75000"/>
-                  </a:schemeClr>
+              <a:rPr lang="en-US" sz="800" dirty="0" smtClean="0">
+                <a:solidFill>
+                  <a:schemeClr val="bg1"/>
                 </a:solidFill>
               </a:rPr>
               <a:t>worksFor</a:t>
             </a:r>
             <a:endParaRPr lang="en-US" sz="800" dirty="0">
               <a:solidFill>
-                <a:schemeClr val="accent6">
-                  <a:lumMod val="75000"/>
-                </a:schemeClr>
+                <a:schemeClr val="bg1"/>
               </a:solidFill>
             </a:endParaRPr>
           </a:p>
@@ -3552,7 +3524,7 @@
             <a:avLst/>
           </a:prstGeom>
           <a:solidFill>
-            <a:schemeClr val="bg1"/>
+            <a:srgbClr val="312D2A"/>
           </a:solidFill>
         </p:spPr>
         <p:txBody>
@@ -3562,20 +3534,16 @@
           <a:lstStyle/>
           <a:p>
             <a:r>
-              <a:rPr lang="en-US" sz="800" dirty="0" err="1" smtClean="0">
-                <a:solidFill>
-                  <a:schemeClr val="accent1">
-                    <a:lumMod val="75000"/>
-                  </a:schemeClr>
+              <a:rPr lang="en-US" sz="800" dirty="0" smtClean="0">
+                <a:solidFill>
+                  <a:schemeClr val="bg1"/>
                 </a:solidFill>
               </a:rPr>
               <a:t>ownerOf</a:t>
             </a:r>
             <a:endParaRPr lang="en-US" sz="800" dirty="0">
               <a:solidFill>
-                <a:schemeClr val="accent1">
-                  <a:lumMod val="75000"/>
-                </a:schemeClr>
+                <a:schemeClr val="bg1"/>
               </a:solidFill>
             </a:endParaRPr>
           </a:p>
@@ -3596,7 +3564,7 @@
             <a:avLst/>
           </a:prstGeom>
           <a:solidFill>
-            <a:schemeClr val="bg1"/>
+            <a:srgbClr val="312D2A"/>
           </a:solidFill>
         </p:spPr>
         <p:txBody>
@@ -3606,20 +3574,16 @@
           <a:lstStyle/>
           <a:p>
             <a:r>
-              <a:rPr lang="en-US" sz="800" dirty="0" err="1" smtClean="0">
-                <a:solidFill>
-                  <a:schemeClr val="accent1">
-                    <a:lumMod val="75000"/>
-                  </a:schemeClr>
+              <a:rPr lang="en-US" sz="800" dirty="0" smtClean="0">
+                <a:solidFill>
+                  <a:schemeClr val="bg1"/>
                 </a:solidFill>
               </a:rPr>
               <a:t>ownerOf</a:t>
             </a:r>
             <a:endParaRPr lang="en-US" sz="800" dirty="0">
               <a:solidFill>
-                <a:schemeClr val="accent1">
-                  <a:lumMod val="75000"/>
-                </a:schemeClr>
+                <a:schemeClr val="bg1"/>
               </a:solidFill>
             </a:endParaRPr>
           </a:p>
@@ -3640,7 +3604,7 @@
             <a:avLst/>
           </a:prstGeom>
           <a:solidFill>
-            <a:schemeClr val="bg1"/>
+            <a:srgbClr val="312D2A"/>
           </a:solidFill>
         </p:spPr>
         <p:txBody>
@@ -3650,20 +3614,16 @@
           <a:lstStyle/>
           <a:p>
             <a:r>
-              <a:rPr lang="en-US" sz="800" dirty="0" err="1" smtClean="0">
-                <a:solidFill>
-                  <a:schemeClr val="accent1">
-                    <a:lumMod val="75000"/>
-                  </a:schemeClr>
+              <a:rPr lang="en-US" sz="800" dirty="0" smtClean="0">
+                <a:solidFill>
+                  <a:schemeClr val="bg1"/>
                 </a:solidFill>
               </a:rPr>
               <a:t>ownerOf</a:t>
             </a:r>
             <a:endParaRPr lang="en-US" sz="800" dirty="0">
               <a:solidFill>
-                <a:schemeClr val="accent1">
-                  <a:lumMod val="75000"/>
-                </a:schemeClr>
+                <a:schemeClr val="bg1"/>
               </a:solidFill>
             </a:endParaRPr>
           </a:p>
@@ -3684,7 +3644,7 @@
             <a:avLst/>
           </a:prstGeom>
           <a:solidFill>
-            <a:schemeClr val="bg1"/>
+            <a:srgbClr val="312D2A"/>
           </a:solidFill>
         </p:spPr>
         <p:txBody>
@@ -3694,20 +3654,16 @@
           <a:lstStyle/>
           <a:p>
             <a:r>
-              <a:rPr lang="en-US" sz="800" dirty="0" err="1" smtClean="0">
-                <a:solidFill>
-                  <a:schemeClr val="accent1">
-                    <a:lumMod val="75000"/>
-                  </a:schemeClr>
+              <a:rPr lang="en-US" sz="800" dirty="0" smtClean="0">
+                <a:solidFill>
+                  <a:schemeClr val="bg1"/>
                 </a:solidFill>
               </a:rPr>
               <a:t>ownerOf</a:t>
             </a:r>
             <a:endParaRPr lang="en-US" sz="800" dirty="0">
               <a:solidFill>
-                <a:schemeClr val="accent1">
-                  <a:lumMod val="75000"/>
-                </a:schemeClr>
+                <a:schemeClr val="bg1"/>
               </a:solidFill>
             </a:endParaRPr>
           </a:p>
@@ -3728,7 +3684,7 @@
             <a:avLst/>
           </a:prstGeom>
           <a:solidFill>
-            <a:schemeClr val="bg1"/>
+            <a:srgbClr val="312D2A"/>
           </a:solidFill>
         </p:spPr>
         <p:txBody>
@@ -3741,20 +3697,14 @@
             <a:r>
               <a:rPr lang="en-US" sz="800" dirty="0" smtClean="0">
                 <a:solidFill>
-                  <a:schemeClr val="tx1">
-                    <a:lumMod val="85000"/>
-                    <a:lumOff val="15000"/>
-                  </a:schemeClr>
+                  <a:schemeClr val="bg1"/>
                 </a:solidFill>
               </a:rPr>
               <a:t>transaction</a:t>
             </a:r>
             <a:endParaRPr lang="en-US" sz="800" b="1" dirty="0">
               <a:solidFill>
-                <a:schemeClr val="tx1">
-                  <a:lumMod val="85000"/>
-                  <a:lumOff val="15000"/>
-                </a:schemeClr>
+                <a:schemeClr val="bg1"/>
               </a:solidFill>
             </a:endParaRPr>
           </a:p>
@@ -3775,7 +3725,7 @@
             <a:avLst/>
           </a:prstGeom>
           <a:solidFill>
-            <a:schemeClr val="bg1"/>
+            <a:srgbClr val="312D2A"/>
           </a:solidFill>
         </p:spPr>
         <p:txBody>
@@ -3787,20 +3737,14 @@
             <a:r>
               <a:rPr lang="en-US" sz="800" dirty="0" smtClean="0">
                 <a:solidFill>
-                  <a:schemeClr val="tx1">
-                    <a:lumMod val="85000"/>
-                    <a:lumOff val="15000"/>
-                  </a:schemeClr>
+                  <a:schemeClr val="bg1"/>
                 </a:solidFill>
               </a:rPr>
               <a:t>transaction</a:t>
             </a:r>
             <a:endParaRPr lang="en-US" sz="800" dirty="0">
               <a:solidFill>
-                <a:schemeClr val="tx1">
-                  <a:lumMod val="85000"/>
-                  <a:lumOff val="15000"/>
-                </a:schemeClr>
+                <a:schemeClr val="bg1"/>
               </a:solidFill>
             </a:endParaRPr>
           </a:p>
@@ -3820,9 +3764,7 @@
           <a:prstGeom prst="rect">
             <a:avLst/>
           </a:prstGeom>
-          <a:solidFill>
-            <a:schemeClr val="bg1"/>
-          </a:solidFill>
+          <a:noFill/>
         </p:spPr>
         <p:txBody>
           <a:bodyPr wrap="none" lIns="18288" tIns="0" rIns="18288" bIns="0" rtlCol="0">
@@ -3834,10 +3776,7 @@
             <a:r>
               <a:rPr lang="en-US" sz="800" dirty="0" smtClean="0">
                 <a:solidFill>
-                  <a:schemeClr val="tx1">
-                    <a:lumMod val="85000"/>
-                    <a:lumOff val="15000"/>
-                  </a:schemeClr>
+                  <a:schemeClr val="bg1"/>
                 </a:solidFill>
               </a:rPr>
               <a:t>amount: </a:t>
@@ -3845,10 +3784,7 @@
             <a:r>
               <a:rPr lang="en-US" sz="800" b="1" dirty="0">
                 <a:solidFill>
-                  <a:schemeClr val="tx1">
-                    <a:lumMod val="85000"/>
-                    <a:lumOff val="15000"/>
-                  </a:schemeClr>
+                  <a:schemeClr val="bg1"/>
                 </a:solidFill>
               </a:rPr>
               <a:t>$</a:t>
@@ -3856,20 +3792,14 @@
             <a:r>
               <a:rPr lang="en-US" sz="800" b="1" dirty="0" smtClean="0">
                 <a:solidFill>
-                  <a:schemeClr val="tx1">
-                    <a:lumMod val="85000"/>
-                    <a:lumOff val="15000"/>
-                  </a:schemeClr>
+                  <a:schemeClr val="bg1"/>
                 </a:solidFill>
               </a:rPr>
               <a:t>9900.00</a:t>
             </a:r>
             <a:endParaRPr lang="en-US" sz="800" b="1" dirty="0">
               <a:solidFill>
-                <a:schemeClr val="tx1">
-                  <a:lumMod val="85000"/>
-                  <a:lumOff val="15000"/>
-                </a:schemeClr>
+                <a:schemeClr val="bg1"/>
               </a:solidFill>
             </a:endParaRPr>
           </a:p>
@@ -3891,9 +3821,7 @@
           </a:prstGeom>
           <a:ln>
             <a:solidFill>
-              <a:schemeClr val="accent3">
-                <a:lumMod val="75000"/>
-              </a:schemeClr>
+              <a:srgbClr val="759C6C"/>
             </a:solidFill>
             <a:tailEnd type="triangle" w="med" len="sm"/>
           </a:ln>
@@ -3928,9 +3856,7 @@
             <a:avLst/>
           </a:prstGeom>
           <a:solidFill>
-            <a:schemeClr val="bg1">
-              <a:lumMod val="85000"/>
-            </a:schemeClr>
+            <a:srgbClr val="759C6C"/>
           </a:solidFill>
           <a:ln w="6350">
             <a:solidFill>
@@ -3965,20 +3891,14 @@
             <a:r>
               <a:rPr lang="en-US" sz="800" dirty="0" smtClean="0">
                 <a:solidFill>
-                  <a:schemeClr val="tx1">
-                    <a:lumMod val="85000"/>
-                    <a:lumOff val="15000"/>
-                  </a:schemeClr>
+                  <a:schemeClr val="bg1"/>
                 </a:solidFill>
               </a:rPr>
               <a:t>Account</a:t>
             </a:r>
             <a:endParaRPr lang="en-US" sz="800" dirty="0">
               <a:solidFill>
-                <a:schemeClr val="tx1">
-                  <a:lumMod val="85000"/>
-                  <a:lumOff val="15000"/>
-                </a:schemeClr>
+                <a:schemeClr val="bg1"/>
               </a:solidFill>
             </a:endParaRPr>
           </a:p>
@@ -3999,7 +3919,7 @@
             <a:avLst/>
           </a:prstGeom>
           <a:solidFill>
-            <a:schemeClr val="bg1"/>
+            <a:srgbClr val="312D2A"/>
           </a:solidFill>
         </p:spPr>
         <p:txBody>
@@ -4012,20 +3932,14 @@
             <a:r>
               <a:rPr lang="en-US" sz="800" dirty="0" smtClean="0">
                 <a:solidFill>
-                  <a:schemeClr val="tx1">
-                    <a:lumMod val="85000"/>
-                    <a:lumOff val="15000"/>
-                  </a:schemeClr>
+                  <a:schemeClr val="bg1"/>
                 </a:solidFill>
               </a:rPr>
               <a:t>transaction</a:t>
             </a:r>
             <a:endParaRPr lang="en-US" sz="800" b="1" dirty="0">
               <a:solidFill>
-                <a:schemeClr val="tx1">
-                  <a:lumMod val="85000"/>
-                  <a:lumOff val="15000"/>
-                </a:schemeClr>
+                <a:schemeClr val="bg1"/>
               </a:solidFill>
             </a:endParaRPr>
           </a:p>
@@ -4045,9 +3959,7 @@
           <a:prstGeom prst="rect">
             <a:avLst/>
           </a:prstGeom>
-          <a:solidFill>
-            <a:schemeClr val="bg1"/>
-          </a:solidFill>
+          <a:noFill/>
         </p:spPr>
         <p:txBody>
           <a:bodyPr wrap="none" lIns="18288" tIns="0" rIns="18288" bIns="0" rtlCol="0">
@@ -4059,10 +3971,7 @@
             <a:r>
               <a:rPr lang="en-US" sz="800" dirty="0" smtClean="0">
                 <a:solidFill>
-                  <a:schemeClr val="tx1">
-                    <a:lumMod val="85000"/>
-                    <a:lumOff val="15000"/>
-                  </a:schemeClr>
+                  <a:schemeClr val="bg1"/>
                 </a:solidFill>
               </a:rPr>
               <a:t>amount: </a:t>
@@ -4070,20 +3979,14 @@
             <a:r>
               <a:rPr lang="en-US" sz="800" b="1" dirty="0" smtClean="0">
                 <a:solidFill>
-                  <a:schemeClr val="tx1">
-                    <a:lumMod val="85000"/>
-                    <a:lumOff val="15000"/>
-                  </a:schemeClr>
+                  <a:schemeClr val="bg1"/>
                 </a:solidFill>
               </a:rPr>
               <a:t>$1000.00</a:t>
             </a:r>
             <a:endParaRPr lang="en-US" sz="800" b="1" dirty="0">
               <a:solidFill>
-                <a:schemeClr val="tx1">
-                  <a:lumMod val="85000"/>
-                  <a:lumOff val="15000"/>
-                </a:schemeClr>
+                <a:schemeClr val="bg1"/>
               </a:solidFill>
             </a:endParaRPr>
           </a:p>
@@ -4103,9 +4006,7 @@
           <a:prstGeom prst="rect">
             <a:avLst/>
           </a:prstGeom>
-          <a:solidFill>
-            <a:schemeClr val="bg1"/>
-          </a:solidFill>
+          <a:noFill/>
         </p:spPr>
         <p:txBody>
           <a:bodyPr wrap="none" lIns="18288" tIns="0" rIns="18288" bIns="0" rtlCol="0">
@@ -4117,10 +4018,7 @@
             <a:r>
               <a:rPr lang="en-US" sz="800" dirty="0" smtClean="0">
                 <a:solidFill>
-                  <a:schemeClr val="tx1">
-                    <a:lumMod val="85000"/>
-                    <a:lumOff val="15000"/>
-                  </a:schemeClr>
+                  <a:schemeClr val="bg1"/>
                 </a:solidFill>
               </a:rPr>
               <a:t>name:</a:t>
@@ -4128,30 +4026,21 @@
             <a:br>
               <a:rPr lang="en-US" sz="800" dirty="0" smtClean="0">
                 <a:solidFill>
-                  <a:schemeClr val="tx1">
-                    <a:lumMod val="85000"/>
-                    <a:lumOff val="15000"/>
-                  </a:schemeClr>
+                  <a:schemeClr val="bg1"/>
                 </a:solidFill>
               </a:rPr>
             </a:br>
             <a:r>
               <a:rPr lang="en-US" sz="800" b="1" dirty="0" smtClean="0">
                 <a:solidFill>
-                  <a:schemeClr val="tx1">
-                    <a:lumMod val="85000"/>
-                    <a:lumOff val="15000"/>
-                  </a:schemeClr>
+                  <a:schemeClr val="bg1"/>
                 </a:solidFill>
               </a:rPr>
               <a:t>Oracle</a:t>
             </a:r>
             <a:endParaRPr lang="en-US" sz="800" b="1" dirty="0">
               <a:solidFill>
-                <a:schemeClr val="tx1">
-                  <a:lumMod val="85000"/>
-                  <a:lumOff val="15000"/>
-                </a:schemeClr>
+                <a:schemeClr val="bg1"/>
               </a:solidFill>
             </a:endParaRPr>
           </a:p>
@@ -4171,9 +4060,7 @@
           <a:prstGeom prst="rect">
             <a:avLst/>
           </a:prstGeom>
-          <a:solidFill>
-            <a:schemeClr val="bg1"/>
-          </a:solidFill>
+          <a:noFill/>
         </p:spPr>
         <p:txBody>
           <a:bodyPr wrap="none" lIns="18288" tIns="0" rIns="18288" bIns="0" rtlCol="0">
@@ -4185,10 +4072,7 @@
             <a:r>
               <a:rPr lang="en-US" sz="800" dirty="0" smtClean="0">
                 <a:solidFill>
-                  <a:schemeClr val="tx1">
-                    <a:lumMod val="85000"/>
-                    <a:lumOff val="15000"/>
-                  </a:schemeClr>
+                  <a:schemeClr val="bg1"/>
                 </a:solidFill>
               </a:rPr>
               <a:t>name:</a:t>
@@ -4196,30 +4080,21 @@
             <a:br>
               <a:rPr lang="en-US" sz="800" dirty="0" smtClean="0">
                 <a:solidFill>
-                  <a:schemeClr val="tx1">
-                    <a:lumMod val="85000"/>
-                    <a:lumOff val="15000"/>
-                  </a:schemeClr>
+                  <a:schemeClr val="bg1"/>
                 </a:solidFill>
               </a:rPr>
             </a:br>
             <a:r>
               <a:rPr lang="en-US" sz="800" b="1" dirty="0" smtClean="0">
                 <a:solidFill>
-                  <a:schemeClr val="tx1">
-                    <a:lumMod val="85000"/>
-                    <a:lumOff val="15000"/>
-                  </a:schemeClr>
+                  <a:schemeClr val="bg1"/>
                 </a:solidFill>
               </a:rPr>
               <a:t>Liam</a:t>
             </a:r>
             <a:endParaRPr lang="en-US" sz="800" b="1" dirty="0">
               <a:solidFill>
-                <a:schemeClr val="tx1">
-                  <a:lumMod val="85000"/>
-                  <a:lumOff val="15000"/>
-                </a:schemeClr>
+                <a:schemeClr val="bg1"/>
               </a:solidFill>
             </a:endParaRPr>
           </a:p>
@@ -4239,9 +4114,7 @@
           <a:prstGeom prst="rect">
             <a:avLst/>
           </a:prstGeom>
-          <a:solidFill>
-            <a:schemeClr val="bg1"/>
-          </a:solidFill>
+          <a:noFill/>
         </p:spPr>
         <p:txBody>
           <a:bodyPr wrap="none" lIns="18288" tIns="0" rIns="18288" bIns="0" rtlCol="0">
@@ -4253,10 +4126,7 @@
             <a:r>
               <a:rPr lang="en-US" sz="800" dirty="0" smtClean="0">
                 <a:solidFill>
-                  <a:schemeClr val="tx1">
-                    <a:lumMod val="85000"/>
-                    <a:lumOff val="15000"/>
-                  </a:schemeClr>
+                  <a:schemeClr val="bg1"/>
                 </a:solidFill>
               </a:rPr>
               <a:t>name:</a:t>
@@ -4264,30 +4134,21 @@
             <a:br>
               <a:rPr lang="en-US" sz="800" dirty="0" smtClean="0">
                 <a:solidFill>
-                  <a:schemeClr val="tx1">
-                    <a:lumMod val="85000"/>
-                    <a:lumOff val="15000"/>
-                  </a:schemeClr>
+                  <a:schemeClr val="bg1"/>
                 </a:solidFill>
               </a:rPr>
             </a:br>
             <a:r>
               <a:rPr lang="en-US" sz="800" b="1" dirty="0" smtClean="0">
                 <a:solidFill>
-                  <a:schemeClr val="tx1">
-                    <a:lumMod val="85000"/>
-                    <a:lumOff val="15000"/>
-                  </a:schemeClr>
+                  <a:schemeClr val="bg1"/>
                 </a:solidFill>
               </a:rPr>
               <a:t>Nikita</a:t>
             </a:r>
             <a:endParaRPr lang="en-US" sz="800" b="1" dirty="0">
               <a:solidFill>
-                <a:schemeClr val="tx1">
-                  <a:lumMod val="85000"/>
-                  <a:lumOff val="15000"/>
-                </a:schemeClr>
+                <a:schemeClr val="bg1"/>
               </a:solidFill>
             </a:endParaRPr>
           </a:p>
@@ -4307,9 +4168,7 @@
           <a:prstGeom prst="rect">
             <a:avLst/>
           </a:prstGeom>
-          <a:solidFill>
-            <a:schemeClr val="bg1"/>
-          </a:solidFill>
+          <a:noFill/>
         </p:spPr>
         <p:txBody>
           <a:bodyPr wrap="none" lIns="18288" tIns="0" rIns="18288" bIns="0" rtlCol="0">
@@ -4321,10 +4180,7 @@
             <a:r>
               <a:rPr lang="en-US" sz="800" dirty="0" smtClean="0">
                 <a:solidFill>
-                  <a:schemeClr val="tx1">
-                    <a:lumMod val="85000"/>
-                    <a:lumOff val="15000"/>
-                  </a:schemeClr>
+                  <a:schemeClr val="bg1"/>
                 </a:solidFill>
               </a:rPr>
               <a:t>name:</a:t>
@@ -4332,30 +4188,21 @@
             <a:br>
               <a:rPr lang="en-US" sz="800" dirty="0" smtClean="0">
                 <a:solidFill>
-                  <a:schemeClr val="tx1">
-                    <a:lumMod val="85000"/>
-                    <a:lumOff val="15000"/>
-                  </a:schemeClr>
+                  <a:schemeClr val="bg1"/>
                 </a:solidFill>
               </a:rPr>
             </a:br>
             <a:r>
               <a:rPr lang="en-US" sz="800" b="1" dirty="0" smtClean="0">
                 <a:solidFill>
-                  <a:schemeClr val="tx1">
-                    <a:lumMod val="85000"/>
-                    <a:lumOff val="15000"/>
-                  </a:schemeClr>
+                  <a:schemeClr val="bg1"/>
                 </a:solidFill>
               </a:rPr>
               <a:t>Camille</a:t>
             </a:r>
             <a:endParaRPr lang="en-US" sz="800" b="1" dirty="0">
               <a:solidFill>
-                <a:schemeClr val="tx1">
-                  <a:lumMod val="85000"/>
-                  <a:lumOff val="15000"/>
-                </a:schemeClr>
+                <a:schemeClr val="bg1"/>
               </a:solidFill>
             </a:endParaRPr>
           </a:p>
@@ -4376,10 +4223,7 @@
             <a:avLst/>
           </a:prstGeom>
           <a:solidFill>
-            <a:schemeClr val="accent5">
-              <a:lumMod val="60000"/>
-              <a:lumOff val="40000"/>
-            </a:schemeClr>
+            <a:srgbClr val="41817E"/>
           </a:solidFill>
           <a:ln w="6350">
             <a:solidFill>
@@ -4414,20 +4258,14 @@
             <a:r>
               <a:rPr lang="en-US" sz="800" dirty="0" smtClean="0">
                 <a:solidFill>
-                  <a:schemeClr val="tx1">
-                    <a:lumMod val="85000"/>
-                    <a:lumOff val="15000"/>
-                  </a:schemeClr>
+                  <a:schemeClr val="bg1"/>
                 </a:solidFill>
               </a:rPr>
               <a:t>Person</a:t>
             </a:r>
             <a:endParaRPr lang="en-US" sz="800" dirty="0">
               <a:solidFill>
-                <a:schemeClr val="tx1">
-                  <a:lumMod val="85000"/>
-                  <a:lumOff val="15000"/>
-                </a:schemeClr>
+                <a:schemeClr val="bg1"/>
               </a:solidFill>
             </a:endParaRPr>
           </a:p>
@@ -4448,18 +4286,10 @@
             <a:avLst/>
           </a:prstGeom>
           <a:solidFill>
-            <a:schemeClr val="accent6">
-              <a:lumMod val="60000"/>
-              <a:lumOff val="40000"/>
-            </a:schemeClr>
+            <a:srgbClr val="E6AC58"/>
           </a:solidFill>
           <a:ln w="6350">
-            <a:solidFill>
-              <a:schemeClr val="tx1">
-                <a:lumMod val="85000"/>
-                <a:lumOff val="15000"/>
-              </a:schemeClr>
-            </a:solidFill>
+            <a:noFill/>
           </a:ln>
         </p:spPr>
         <p:style>
@@ -4486,20 +4316,14 @@
             <a:r>
               <a:rPr lang="en-US" sz="800" dirty="0" smtClean="0">
                 <a:solidFill>
-                  <a:schemeClr val="tx1">
-                    <a:lumMod val="85000"/>
-                    <a:lumOff val="15000"/>
-                  </a:schemeClr>
+                  <a:schemeClr val="bg1"/>
                 </a:solidFill>
               </a:rPr>
               <a:t>Company</a:t>
             </a:r>
             <a:endParaRPr lang="en-US" sz="800" dirty="0">
               <a:solidFill>
-                <a:schemeClr val="tx1">
-                  <a:lumMod val="85000"/>
-                  <a:lumOff val="15000"/>
-                </a:schemeClr>
+                <a:schemeClr val="bg1"/>
               </a:solidFill>
             </a:endParaRPr>
           </a:p>
@@ -4519,9 +4343,7 @@
           <a:prstGeom prst="rect">
             <a:avLst/>
           </a:prstGeom>
-          <a:solidFill>
-            <a:schemeClr val="bg1"/>
-          </a:solidFill>
+          <a:noFill/>
         </p:spPr>
         <p:txBody>
           <a:bodyPr wrap="none" lIns="18288" tIns="0" rIns="18288" bIns="0" rtlCol="0">
@@ -4533,10 +4355,7 @@
             <a:r>
               <a:rPr lang="en-US" sz="800" dirty="0" smtClean="0">
                 <a:solidFill>
-                  <a:schemeClr val="tx1">
-                    <a:lumMod val="85000"/>
-                    <a:lumOff val="15000"/>
-                  </a:schemeClr>
+                  <a:schemeClr val="bg1"/>
                 </a:solidFill>
               </a:rPr>
               <a:t>number: </a:t>
@@ -4544,20 +4363,14 @@
             <a:r>
               <a:rPr lang="en-US" sz="800" b="1" dirty="0" smtClean="0">
                 <a:solidFill>
-                  <a:schemeClr val="tx1">
-                    <a:lumMod val="85000"/>
-                    <a:lumOff val="15000"/>
-                  </a:schemeClr>
+                  <a:schemeClr val="bg1"/>
                 </a:solidFill>
               </a:rPr>
               <a:t>2090</a:t>
             </a:r>
             <a:endParaRPr lang="en-US" sz="800" b="1" dirty="0">
               <a:solidFill>
-                <a:schemeClr val="tx1">
-                  <a:lumMod val="85000"/>
-                  <a:lumOff val="15000"/>
-                </a:schemeClr>
+                <a:schemeClr val="bg1"/>
               </a:solidFill>
             </a:endParaRPr>
           </a:p>
@@ -4577,9 +4390,7 @@
           <a:prstGeom prst="rect">
             <a:avLst/>
           </a:prstGeom>
-          <a:solidFill>
-            <a:schemeClr val="bg1"/>
-          </a:solidFill>
+          <a:noFill/>
         </p:spPr>
         <p:txBody>
           <a:bodyPr wrap="none" lIns="18288" tIns="0" rIns="18288" bIns="0" rtlCol="0">
@@ -4591,10 +4402,7 @@
             <a:r>
               <a:rPr lang="en-US" sz="800" dirty="0" smtClean="0">
                 <a:solidFill>
-                  <a:schemeClr val="tx1">
-                    <a:lumMod val="85000"/>
-                    <a:lumOff val="15000"/>
-                  </a:schemeClr>
+                  <a:schemeClr val="bg1"/>
                 </a:solidFill>
               </a:rPr>
               <a:t>number: </a:t>
@@ -4602,20 +4410,14 @@
             <a:r>
               <a:rPr lang="en-US" sz="800" b="1" dirty="0" smtClean="0">
                 <a:solidFill>
-                  <a:schemeClr val="tx1">
-                    <a:lumMod val="85000"/>
-                    <a:lumOff val="15000"/>
-                  </a:schemeClr>
+                  <a:schemeClr val="bg1"/>
                 </a:solidFill>
               </a:rPr>
               <a:t>10039</a:t>
             </a:r>
             <a:endParaRPr lang="en-US" sz="800" b="1" dirty="0">
               <a:solidFill>
-                <a:schemeClr val="tx1">
-                  <a:lumMod val="85000"/>
-                  <a:lumOff val="15000"/>
-                </a:schemeClr>
+                <a:schemeClr val="bg1"/>
               </a:solidFill>
             </a:endParaRPr>
           </a:p>
@@ -4635,9 +4437,7 @@
           <a:prstGeom prst="rect">
             <a:avLst/>
           </a:prstGeom>
-          <a:solidFill>
-            <a:schemeClr val="bg1"/>
-          </a:solidFill>
+          <a:noFill/>
         </p:spPr>
         <p:txBody>
           <a:bodyPr wrap="none" lIns="18288" tIns="0" rIns="18288" bIns="0" rtlCol="0">
@@ -4649,10 +4449,7 @@
             <a:r>
               <a:rPr lang="en-US" sz="800" dirty="0" smtClean="0">
                 <a:solidFill>
-                  <a:schemeClr val="tx1">
-                    <a:lumMod val="85000"/>
-                    <a:lumOff val="15000"/>
-                  </a:schemeClr>
+                  <a:schemeClr val="bg1"/>
                 </a:solidFill>
               </a:rPr>
               <a:t>number: </a:t>
@@ -4660,20 +4457,14 @@
             <a:r>
               <a:rPr lang="en-US" sz="800" b="1" dirty="0" smtClean="0">
                 <a:solidFill>
-                  <a:schemeClr val="tx1">
-                    <a:lumMod val="85000"/>
-                    <a:lumOff val="15000"/>
-                  </a:schemeClr>
+                  <a:schemeClr val="bg1"/>
                 </a:solidFill>
               </a:rPr>
               <a:t>8021</a:t>
             </a:r>
             <a:endParaRPr lang="en-US" sz="800" b="1" dirty="0">
               <a:solidFill>
-                <a:schemeClr val="tx1">
-                  <a:lumMod val="85000"/>
-                  <a:lumOff val="15000"/>
-                </a:schemeClr>
+                <a:schemeClr val="bg1"/>
               </a:solidFill>
             </a:endParaRPr>
           </a:p>
@@ -4693,9 +4484,7 @@
           <a:prstGeom prst="rect">
             <a:avLst/>
           </a:prstGeom>
-          <a:solidFill>
-            <a:schemeClr val="bg1"/>
-          </a:solidFill>
+          <a:noFill/>
         </p:spPr>
         <p:txBody>
           <a:bodyPr wrap="none" lIns="18288" tIns="0" rIns="18288" bIns="0" rtlCol="0">
@@ -4707,10 +4496,7 @@
             <a:r>
               <a:rPr lang="en-US" sz="800" dirty="0" smtClean="0">
                 <a:solidFill>
-                  <a:schemeClr val="tx1">
-                    <a:lumMod val="85000"/>
-                    <a:lumOff val="15000"/>
-                  </a:schemeClr>
+                  <a:schemeClr val="bg1"/>
                 </a:solidFill>
               </a:rPr>
               <a:t>number: </a:t>
@@ -4718,20 +4504,14 @@
             <a:r>
               <a:rPr lang="en-US" sz="800" b="1" dirty="0" smtClean="0">
                 <a:solidFill>
-                  <a:schemeClr val="tx1">
-                    <a:lumMod val="85000"/>
-                    <a:lumOff val="15000"/>
-                  </a:schemeClr>
+                  <a:schemeClr val="bg1"/>
                 </a:solidFill>
               </a:rPr>
               <a:t>1001</a:t>
             </a:r>
             <a:endParaRPr lang="en-US" sz="800" b="1" dirty="0">
               <a:solidFill>
-                <a:schemeClr val="tx1">
-                  <a:lumMod val="85000"/>
-                  <a:lumOff val="15000"/>
-                </a:schemeClr>
+                <a:schemeClr val="bg1"/>
               </a:solidFill>
             </a:endParaRPr>
           </a:p>
@@ -4753,9 +4533,7 @@
           </a:prstGeom>
           <a:ln>
             <a:solidFill>
-              <a:schemeClr val="accent3">
-                <a:lumMod val="75000"/>
-              </a:schemeClr>
+              <a:srgbClr val="759C6C"/>
             </a:solidFill>
             <a:tailEnd type="triangle" w="med" len="sm"/>
           </a:ln>
@@ -4790,7 +4568,7 @@
             <a:avLst/>
           </a:prstGeom>
           <a:solidFill>
-            <a:schemeClr val="bg1"/>
+            <a:srgbClr val="312D2A"/>
           </a:solidFill>
         </p:spPr>
         <p:txBody>
@@ -4803,20 +4581,14 @@
             <a:r>
               <a:rPr lang="en-US" sz="800" dirty="0" smtClean="0">
                 <a:solidFill>
-                  <a:schemeClr val="tx1">
-                    <a:lumMod val="85000"/>
-                    <a:lumOff val="15000"/>
-                  </a:schemeClr>
+                  <a:schemeClr val="bg1"/>
                 </a:solidFill>
               </a:rPr>
               <a:t>transaction</a:t>
             </a:r>
             <a:endParaRPr lang="en-US" sz="800" b="1" dirty="0">
               <a:solidFill>
-                <a:schemeClr val="tx1">
-                  <a:lumMod val="85000"/>
-                  <a:lumOff val="15000"/>
-                </a:schemeClr>
+                <a:schemeClr val="bg1"/>
               </a:solidFill>
             </a:endParaRPr>
           </a:p>
@@ -4838,9 +4610,7 @@
           </a:prstGeom>
           <a:ln>
             <a:solidFill>
-              <a:schemeClr val="accent3">
-                <a:lumMod val="75000"/>
-              </a:schemeClr>
+              <a:srgbClr val="759C6C"/>
             </a:solidFill>
             <a:tailEnd type="triangle" w="med" len="sm"/>
           </a:ln>
@@ -4875,9 +4645,7 @@
             <a:avLst/>
           </a:prstGeom>
           <a:solidFill>
-            <a:schemeClr val="bg1">
-              <a:lumMod val="85000"/>
-            </a:schemeClr>
+            <a:srgbClr val="759C6C"/>
           </a:solidFill>
           <a:ln w="6350">
             <a:solidFill>
@@ -4912,20 +4680,14 @@
             <a:r>
               <a:rPr lang="en-US" sz="800" dirty="0" smtClean="0">
                 <a:solidFill>
-                  <a:schemeClr val="tx1">
-                    <a:lumMod val="85000"/>
-                    <a:lumOff val="15000"/>
-                  </a:schemeClr>
+                  <a:schemeClr val="bg1"/>
                 </a:solidFill>
               </a:rPr>
               <a:t>Account</a:t>
             </a:r>
             <a:endParaRPr lang="en-US" sz="800" dirty="0">
               <a:solidFill>
-                <a:schemeClr val="tx1">
-                  <a:lumMod val="85000"/>
-                  <a:lumOff val="15000"/>
-                </a:schemeClr>
+                <a:schemeClr val="bg1"/>
               </a:solidFill>
             </a:endParaRPr>
           </a:p>
@@ -4946,7 +4708,7 @@
             <a:avLst/>
           </a:prstGeom>
           <a:solidFill>
-            <a:schemeClr val="bg1"/>
+            <a:srgbClr val="312D2A"/>
           </a:solidFill>
         </p:spPr>
         <p:txBody>
@@ -4959,20 +4721,14 @@
             <a:r>
               <a:rPr lang="en-US" sz="800" dirty="0" smtClean="0">
                 <a:solidFill>
-                  <a:schemeClr val="tx1">
-                    <a:lumMod val="85000"/>
-                    <a:lumOff val="15000"/>
-                  </a:schemeClr>
+                  <a:schemeClr val="bg1"/>
                 </a:solidFill>
               </a:rPr>
               <a:t>transaction</a:t>
             </a:r>
             <a:endParaRPr lang="en-US" sz="800" b="1" dirty="0">
               <a:solidFill>
-                <a:schemeClr val="tx1">
-                  <a:lumMod val="85000"/>
-                  <a:lumOff val="15000"/>
-                </a:schemeClr>
+                <a:schemeClr val="bg1"/>
               </a:solidFill>
             </a:endParaRPr>
           </a:p>
@@ -4992,9 +4748,7 @@
           <a:prstGeom prst="rect">
             <a:avLst/>
           </a:prstGeom>
-          <a:solidFill>
-            <a:schemeClr val="bg1"/>
-          </a:solidFill>
+          <a:noFill/>
         </p:spPr>
         <p:txBody>
           <a:bodyPr wrap="none" lIns="18288" tIns="0" rIns="18288" bIns="0" rtlCol="0">
@@ -5006,10 +4760,7 @@
             <a:r>
               <a:rPr lang="en-US" sz="800" dirty="0" smtClean="0">
                 <a:solidFill>
-                  <a:schemeClr val="tx1">
-                    <a:lumMod val="85000"/>
-                    <a:lumOff val="15000"/>
-                  </a:schemeClr>
+                  <a:schemeClr val="bg1"/>
                 </a:solidFill>
               </a:rPr>
               <a:t>amount: </a:t>
@@ -5017,20 +4768,14 @@
             <a:r>
               <a:rPr lang="en-US" sz="800" b="1" dirty="0" smtClean="0">
                 <a:solidFill>
-                  <a:schemeClr val="tx1">
-                    <a:lumMod val="85000"/>
-                    <a:lumOff val="15000"/>
-                  </a:schemeClr>
+                  <a:schemeClr val="bg1"/>
                 </a:solidFill>
               </a:rPr>
               <a:t>$3000.70</a:t>
             </a:r>
             <a:endParaRPr lang="en-US" sz="800" b="1" dirty="0">
               <a:solidFill>
-                <a:schemeClr val="tx1">
-                  <a:lumMod val="85000"/>
-                  <a:lumOff val="15000"/>
-                </a:schemeClr>
+                <a:schemeClr val="bg1"/>
               </a:solidFill>
             </a:endParaRPr>
           </a:p>
@@ -5051,9 +4796,7 @@
             <a:avLst/>
           </a:prstGeom>
           <a:solidFill>
-            <a:schemeClr val="bg1">
-              <a:lumMod val="85000"/>
-            </a:schemeClr>
+            <a:srgbClr val="759C6C"/>
           </a:solidFill>
           <a:ln w="6350">
             <a:solidFill>
@@ -5088,20 +4831,14 @@
             <a:r>
               <a:rPr lang="en-US" sz="800" dirty="0" smtClean="0">
                 <a:solidFill>
-                  <a:schemeClr val="tx1">
-                    <a:lumMod val="85000"/>
-                    <a:lumOff val="15000"/>
-                  </a:schemeClr>
+                  <a:schemeClr val="bg1"/>
                 </a:solidFill>
               </a:rPr>
               <a:t>Account</a:t>
             </a:r>
             <a:endParaRPr lang="en-US" sz="800" dirty="0">
               <a:solidFill>
-                <a:schemeClr val="tx1">
-                  <a:lumMod val="85000"/>
-                  <a:lumOff val="15000"/>
-                </a:schemeClr>
+                <a:schemeClr val="bg1"/>
               </a:solidFill>
             </a:endParaRPr>
           </a:p>
@@ -5121,9 +4858,7 @@
           <a:prstGeom prst="rect">
             <a:avLst/>
           </a:prstGeom>
-          <a:solidFill>
-            <a:schemeClr val="bg1"/>
-          </a:solidFill>
+          <a:noFill/>
         </p:spPr>
         <p:txBody>
           <a:bodyPr wrap="none" lIns="18288" tIns="0" rIns="18288" bIns="0" rtlCol="0">
@@ -5135,10 +4870,7 @@
             <a:r>
               <a:rPr lang="en-US" sz="800" dirty="0" smtClean="0">
                 <a:solidFill>
-                  <a:schemeClr val="tx1">
-                    <a:lumMod val="85000"/>
-                    <a:lumOff val="15000"/>
-                  </a:schemeClr>
+                  <a:schemeClr val="bg1"/>
                 </a:solidFill>
               </a:rPr>
               <a:t>amount: </a:t>
@@ -5146,20 +4878,14 @@
             <a:r>
               <a:rPr lang="en-US" sz="800" b="1" dirty="0" smtClean="0">
                 <a:solidFill>
-                  <a:schemeClr val="tx1">
-                    <a:lumMod val="85000"/>
-                    <a:lumOff val="15000"/>
-                  </a:schemeClr>
+                  <a:schemeClr val="bg1"/>
                 </a:solidFill>
               </a:rPr>
               <a:t>$1500.30</a:t>
             </a:r>
             <a:endParaRPr lang="en-US" sz="800" b="1" dirty="0">
               <a:solidFill>
-                <a:schemeClr val="tx1">
-                  <a:lumMod val="85000"/>
-                  <a:lumOff val="15000"/>
-                </a:schemeClr>
+                <a:schemeClr val="bg1"/>
               </a:solidFill>
             </a:endParaRPr>
           </a:p>
@@ -5179,9 +4905,7 @@
           <a:prstGeom prst="rect">
             <a:avLst/>
           </a:prstGeom>
-          <a:solidFill>
-            <a:schemeClr val="bg1"/>
-          </a:solidFill>
+          <a:noFill/>
         </p:spPr>
         <p:txBody>
           <a:bodyPr wrap="none" lIns="18288" tIns="0" rIns="18288" bIns="0" rtlCol="0">
@@ -5192,10 +4916,7 @@
             <a:r>
               <a:rPr lang="en-US" sz="800" dirty="0">
                 <a:solidFill>
-                  <a:schemeClr val="tx1">
-                    <a:lumMod val="85000"/>
-                    <a:lumOff val="15000"/>
-                  </a:schemeClr>
+                  <a:schemeClr val="bg1"/>
                 </a:solidFill>
               </a:rPr>
               <a:t>a</a:t>
@@ -5203,10 +4924,7 @@
             <a:r>
               <a:rPr lang="en-US" sz="800" dirty="0" smtClean="0">
                 <a:solidFill>
-                  <a:schemeClr val="tx1">
-                    <a:lumMod val="85000"/>
-                    <a:lumOff val="15000"/>
-                  </a:schemeClr>
+                  <a:schemeClr val="bg1"/>
                 </a:solidFill>
               </a:rPr>
               <a:t>mount: </a:t>
@@ -5214,20 +4932,14 @@
             <a:r>
               <a:rPr lang="en-US" sz="800" b="1" dirty="0" smtClean="0">
                 <a:solidFill>
-                  <a:schemeClr val="tx1">
-                    <a:lumMod val="85000"/>
-                    <a:lumOff val="15000"/>
-                  </a:schemeClr>
+                  <a:schemeClr val="bg1"/>
                 </a:solidFill>
               </a:rPr>
               <a:t>$9999.50</a:t>
             </a:r>
             <a:endParaRPr lang="en-US" sz="800" b="1" dirty="0">
               <a:solidFill>
-                <a:schemeClr val="tx1">
-                  <a:lumMod val="85000"/>
-                  <a:lumOff val="15000"/>
-                </a:schemeClr>
+                <a:schemeClr val="bg1"/>
               </a:solidFill>
             </a:endParaRPr>
           </a:p>

</xml_diff>

<commit_message>
dark font for vertex labels
</commit_message>
<xml_diff>
--- a/images/example_graphs/financial_transactions.pptx
+++ b/images/example_graphs/financial_transactions.pptx
@@ -3141,14 +3141,14 @@
             <a:r>
               <a:rPr lang="en-US" sz="800" dirty="0" smtClean="0">
                 <a:solidFill>
-                  <a:schemeClr val="bg1"/>
+                  <a:srgbClr val="312D2A"/>
                 </a:solidFill>
               </a:rPr>
               <a:t>Account</a:t>
             </a:r>
             <a:endParaRPr lang="en-US" sz="800" dirty="0">
               <a:solidFill>
-                <a:schemeClr val="bg1"/>
+                <a:srgbClr val="312D2A"/>
               </a:solidFill>
             </a:endParaRPr>
           </a:p>
@@ -3243,14 +3243,14 @@
             <a:r>
               <a:rPr lang="en-US" sz="800" dirty="0" smtClean="0">
                 <a:solidFill>
-                  <a:schemeClr val="bg1"/>
+                  <a:srgbClr val="312D2A"/>
                 </a:solidFill>
               </a:rPr>
               <a:t>Person</a:t>
             </a:r>
             <a:endParaRPr lang="en-US" sz="800" dirty="0">
               <a:solidFill>
-                <a:schemeClr val="bg1"/>
+                <a:srgbClr val="312D2A"/>
               </a:solidFill>
             </a:endParaRPr>
           </a:p>
@@ -3306,14 +3306,14 @@
             <a:r>
               <a:rPr lang="en-US" sz="800" dirty="0" smtClean="0">
                 <a:solidFill>
-                  <a:schemeClr val="bg1"/>
+                  <a:srgbClr val="312D2A"/>
                 </a:solidFill>
               </a:rPr>
               <a:t>Person</a:t>
             </a:r>
             <a:endParaRPr lang="en-US" sz="800" dirty="0">
               <a:solidFill>
-                <a:schemeClr val="bg1"/>
+                <a:srgbClr val="312D2A"/>
               </a:solidFill>
             </a:endParaRPr>
           </a:p>
@@ -3891,14 +3891,14 @@
             <a:r>
               <a:rPr lang="en-US" sz="800" dirty="0" smtClean="0">
                 <a:solidFill>
-                  <a:schemeClr val="bg1"/>
+                  <a:srgbClr val="312D2A"/>
                 </a:solidFill>
               </a:rPr>
               <a:t>Account</a:t>
             </a:r>
             <a:endParaRPr lang="en-US" sz="800" dirty="0">
               <a:solidFill>
-                <a:schemeClr val="bg1"/>
+                <a:srgbClr val="312D2A"/>
               </a:solidFill>
             </a:endParaRPr>
           </a:p>
@@ -4258,14 +4258,14 @@
             <a:r>
               <a:rPr lang="en-US" sz="800" dirty="0" smtClean="0">
                 <a:solidFill>
-                  <a:schemeClr val="bg1"/>
+                  <a:srgbClr val="312D2A"/>
                 </a:solidFill>
               </a:rPr>
               <a:t>Person</a:t>
             </a:r>
             <a:endParaRPr lang="en-US" sz="800" dirty="0">
               <a:solidFill>
-                <a:schemeClr val="bg1"/>
+                <a:srgbClr val="312D2A"/>
               </a:solidFill>
             </a:endParaRPr>
           </a:p>
@@ -4316,14 +4316,14 @@
             <a:r>
               <a:rPr lang="en-US" sz="800" dirty="0" smtClean="0">
                 <a:solidFill>
-                  <a:schemeClr val="bg1"/>
+                  <a:srgbClr val="312D2A"/>
                 </a:solidFill>
               </a:rPr>
               <a:t>Company</a:t>
             </a:r>
             <a:endParaRPr lang="en-US" sz="800" dirty="0">
               <a:solidFill>
-                <a:schemeClr val="bg1"/>
+                <a:srgbClr val="312D2A"/>
               </a:solidFill>
             </a:endParaRPr>
           </a:p>
@@ -4680,14 +4680,14 @@
             <a:r>
               <a:rPr lang="en-US" sz="800" dirty="0" smtClean="0">
                 <a:solidFill>
-                  <a:schemeClr val="bg1"/>
+                  <a:srgbClr val="312D2A"/>
                 </a:solidFill>
               </a:rPr>
               <a:t>Account</a:t>
             </a:r>
             <a:endParaRPr lang="en-US" sz="800" dirty="0">
               <a:solidFill>
-                <a:schemeClr val="bg1"/>
+                <a:srgbClr val="312D2A"/>
               </a:solidFill>
             </a:endParaRPr>
           </a:p>
@@ -4831,14 +4831,14 @@
             <a:r>
               <a:rPr lang="en-US" sz="800" dirty="0" smtClean="0">
                 <a:solidFill>
-                  <a:schemeClr val="bg1"/>
+                  <a:srgbClr val="312D2A"/>
                 </a:solidFill>
               </a:rPr>
               <a:t>Account</a:t>
             </a:r>
             <a:endParaRPr lang="en-US" sz="800" dirty="0">
               <a:solidFill>
-                <a:schemeClr val="bg1"/>
+                <a:srgbClr val="312D2A"/>
               </a:solidFill>
             </a:endParaRPr>
           </a:p>

</xml_diff>

<commit_message>
improve schema of financial transactions
</commit_message>
<xml_diff>
--- a/images/example_graphs/financial_transactions.pptx
+++ b/images/example_graphs/financial_transactions.pptx
@@ -154,10 +154,9 @@
           </a:lstStyle>
           <a:p>
             <a:r>
-              <a:rPr lang="en-US" smtClean="0"/>
+              <a:rPr lang="en-US"/>
               <a:t>Click to edit Master title style</a:t>
             </a:r>
-            <a:endParaRPr lang="en-US"/>
           </a:p>
         </p:txBody>
       </p:sp>
@@ -219,10 +218,9 @@
           </a:lstStyle>
           <a:p>
             <a:r>
-              <a:rPr lang="en-US" smtClean="0"/>
+              <a:rPr lang="en-US"/>
               <a:t>Click to edit Master subtitle style</a:t>
             </a:r>
-            <a:endParaRPr lang="en-US"/>
           </a:p>
         </p:txBody>
       </p:sp>
@@ -243,7 +241,7 @@
           <a:p>
             <a:fld id="{79CD65FD-E9A0-4CA5-8F11-E99658C14B86}" type="datetimeFigureOut">
               <a:rPr lang="en-US" smtClean="0"/>
-              <a:t>9/29/2019</a:t>
+              <a:t>11/3/20</a:t>
             </a:fld>
             <a:endParaRPr lang="en-US"/>
           </a:p>
@@ -337,10 +335,9 @@
           <a:lstStyle/>
           <a:p>
             <a:r>
-              <a:rPr lang="en-US" smtClean="0"/>
+              <a:rPr lang="en-US"/>
               <a:t>Click to edit Master title style</a:t>
             </a:r>
-            <a:endParaRPr lang="en-US"/>
           </a:p>
         </p:txBody>
       </p:sp>
@@ -361,38 +358,37 @@
           <a:p>
             <a:pPr lvl="0"/>
             <a:r>
-              <a:rPr lang="en-US" smtClean="0"/>
+              <a:rPr lang="en-US"/>
               <a:t>Edit Master text styles</a:t>
             </a:r>
           </a:p>
           <a:p>
             <a:pPr lvl="1"/>
             <a:r>
-              <a:rPr lang="en-US" smtClean="0"/>
+              <a:rPr lang="en-US"/>
               <a:t>Second level</a:t>
             </a:r>
           </a:p>
           <a:p>
             <a:pPr lvl="2"/>
             <a:r>
-              <a:rPr lang="en-US" smtClean="0"/>
+              <a:rPr lang="en-US"/>
               <a:t>Third level</a:t>
             </a:r>
           </a:p>
           <a:p>
             <a:pPr lvl="3"/>
             <a:r>
-              <a:rPr lang="en-US" smtClean="0"/>
+              <a:rPr lang="en-US"/>
               <a:t>Fourth level</a:t>
             </a:r>
           </a:p>
           <a:p>
             <a:pPr lvl="4"/>
             <a:r>
-              <a:rPr lang="en-US" smtClean="0"/>
+              <a:rPr lang="en-US"/>
               <a:t>Fifth level</a:t>
             </a:r>
-            <a:endParaRPr lang="en-US"/>
           </a:p>
         </p:txBody>
       </p:sp>
@@ -413,7 +409,7 @@
           <a:p>
             <a:fld id="{79CD65FD-E9A0-4CA5-8F11-E99658C14B86}" type="datetimeFigureOut">
               <a:rPr lang="en-US" smtClean="0"/>
-              <a:t>9/29/2019</a:t>
+              <a:t>11/3/20</a:t>
             </a:fld>
             <a:endParaRPr lang="en-US"/>
           </a:p>
@@ -512,10 +508,9 @@
           <a:lstStyle/>
           <a:p>
             <a:r>
-              <a:rPr lang="en-US" smtClean="0"/>
+              <a:rPr lang="en-US"/>
               <a:t>Click to edit Master title style</a:t>
             </a:r>
-            <a:endParaRPr lang="en-US"/>
           </a:p>
         </p:txBody>
       </p:sp>
@@ -541,38 +536,37 @@
           <a:p>
             <a:pPr lvl="0"/>
             <a:r>
-              <a:rPr lang="en-US" smtClean="0"/>
+              <a:rPr lang="en-US"/>
               <a:t>Edit Master text styles</a:t>
             </a:r>
           </a:p>
           <a:p>
             <a:pPr lvl="1"/>
             <a:r>
-              <a:rPr lang="en-US" smtClean="0"/>
+              <a:rPr lang="en-US"/>
               <a:t>Second level</a:t>
             </a:r>
           </a:p>
           <a:p>
             <a:pPr lvl="2"/>
             <a:r>
-              <a:rPr lang="en-US" smtClean="0"/>
+              <a:rPr lang="en-US"/>
               <a:t>Third level</a:t>
             </a:r>
           </a:p>
           <a:p>
             <a:pPr lvl="3"/>
             <a:r>
-              <a:rPr lang="en-US" smtClean="0"/>
+              <a:rPr lang="en-US"/>
               <a:t>Fourth level</a:t>
             </a:r>
           </a:p>
           <a:p>
             <a:pPr lvl="4"/>
             <a:r>
-              <a:rPr lang="en-US" smtClean="0"/>
+              <a:rPr lang="en-US"/>
               <a:t>Fifth level</a:t>
             </a:r>
-            <a:endParaRPr lang="en-US"/>
           </a:p>
         </p:txBody>
       </p:sp>
@@ -593,7 +587,7 @@
           <a:p>
             <a:fld id="{79CD65FD-E9A0-4CA5-8F11-E99658C14B86}" type="datetimeFigureOut">
               <a:rPr lang="en-US" smtClean="0"/>
-              <a:t>9/29/2019</a:t>
+              <a:t>11/3/20</a:t>
             </a:fld>
             <a:endParaRPr lang="en-US"/>
           </a:p>
@@ -687,10 +681,9 @@
           <a:lstStyle/>
           <a:p>
             <a:r>
-              <a:rPr lang="en-US" smtClean="0"/>
+              <a:rPr lang="en-US"/>
               <a:t>Click to edit Master title style</a:t>
             </a:r>
-            <a:endParaRPr lang="en-US"/>
           </a:p>
         </p:txBody>
       </p:sp>
@@ -711,38 +704,37 @@
           <a:p>
             <a:pPr lvl="0"/>
             <a:r>
-              <a:rPr lang="en-US" smtClean="0"/>
+              <a:rPr lang="en-US"/>
               <a:t>Edit Master text styles</a:t>
             </a:r>
           </a:p>
           <a:p>
             <a:pPr lvl="1"/>
             <a:r>
-              <a:rPr lang="en-US" smtClean="0"/>
+              <a:rPr lang="en-US"/>
               <a:t>Second level</a:t>
             </a:r>
           </a:p>
           <a:p>
             <a:pPr lvl="2"/>
             <a:r>
-              <a:rPr lang="en-US" smtClean="0"/>
+              <a:rPr lang="en-US"/>
               <a:t>Third level</a:t>
             </a:r>
           </a:p>
           <a:p>
             <a:pPr lvl="3"/>
             <a:r>
-              <a:rPr lang="en-US" smtClean="0"/>
+              <a:rPr lang="en-US"/>
               <a:t>Fourth level</a:t>
             </a:r>
           </a:p>
           <a:p>
             <a:pPr lvl="4"/>
             <a:r>
-              <a:rPr lang="en-US" smtClean="0"/>
+              <a:rPr lang="en-US"/>
               <a:t>Fifth level</a:t>
             </a:r>
-            <a:endParaRPr lang="en-US"/>
           </a:p>
         </p:txBody>
       </p:sp>
@@ -763,7 +755,7 @@
           <a:p>
             <a:fld id="{79CD65FD-E9A0-4CA5-8F11-E99658C14B86}" type="datetimeFigureOut">
               <a:rPr lang="en-US" smtClean="0"/>
-              <a:t>9/29/2019</a:t>
+              <a:t>11/3/20</a:t>
             </a:fld>
             <a:endParaRPr lang="en-US"/>
           </a:p>
@@ -866,10 +858,9 @@
           </a:lstStyle>
           <a:p>
             <a:r>
-              <a:rPr lang="en-US" smtClean="0"/>
+              <a:rPr lang="en-US"/>
               <a:t>Click to edit Master title style</a:t>
             </a:r>
-            <a:endParaRPr lang="en-US"/>
           </a:p>
         </p:txBody>
       </p:sp>
@@ -986,7 +977,7 @@
           <a:p>
             <a:pPr lvl="0"/>
             <a:r>
-              <a:rPr lang="en-US" smtClean="0"/>
+              <a:rPr lang="en-US"/>
               <a:t>Edit Master text styles</a:t>
             </a:r>
           </a:p>
@@ -1009,7 +1000,7 @@
           <a:p>
             <a:fld id="{79CD65FD-E9A0-4CA5-8F11-E99658C14B86}" type="datetimeFigureOut">
               <a:rPr lang="en-US" smtClean="0"/>
-              <a:t>9/29/2019</a:t>
+              <a:t>11/3/20</a:t>
             </a:fld>
             <a:endParaRPr lang="en-US"/>
           </a:p>
@@ -1103,10 +1094,9 @@
           <a:lstStyle/>
           <a:p>
             <a:r>
-              <a:rPr lang="en-US" smtClean="0"/>
+              <a:rPr lang="en-US"/>
               <a:t>Click to edit Master title style</a:t>
             </a:r>
-            <a:endParaRPr lang="en-US"/>
           </a:p>
         </p:txBody>
       </p:sp>
@@ -1132,38 +1122,37 @@
           <a:p>
             <a:pPr lvl="0"/>
             <a:r>
-              <a:rPr lang="en-US" smtClean="0"/>
+              <a:rPr lang="en-US"/>
               <a:t>Edit Master text styles</a:t>
             </a:r>
           </a:p>
           <a:p>
             <a:pPr lvl="1"/>
             <a:r>
-              <a:rPr lang="en-US" smtClean="0"/>
+              <a:rPr lang="en-US"/>
               <a:t>Second level</a:t>
             </a:r>
           </a:p>
           <a:p>
             <a:pPr lvl="2"/>
             <a:r>
-              <a:rPr lang="en-US" smtClean="0"/>
+              <a:rPr lang="en-US"/>
               <a:t>Third level</a:t>
             </a:r>
           </a:p>
           <a:p>
             <a:pPr lvl="3"/>
             <a:r>
-              <a:rPr lang="en-US" smtClean="0"/>
+              <a:rPr lang="en-US"/>
               <a:t>Fourth level</a:t>
             </a:r>
           </a:p>
           <a:p>
             <a:pPr lvl="4"/>
             <a:r>
-              <a:rPr lang="en-US" smtClean="0"/>
+              <a:rPr lang="en-US"/>
               <a:t>Fifth level</a:t>
             </a:r>
-            <a:endParaRPr lang="en-US"/>
           </a:p>
         </p:txBody>
       </p:sp>
@@ -1189,38 +1178,37 @@
           <a:p>
             <a:pPr lvl="0"/>
             <a:r>
-              <a:rPr lang="en-US" smtClean="0"/>
+              <a:rPr lang="en-US"/>
               <a:t>Edit Master text styles</a:t>
             </a:r>
           </a:p>
           <a:p>
             <a:pPr lvl="1"/>
             <a:r>
-              <a:rPr lang="en-US" smtClean="0"/>
+              <a:rPr lang="en-US"/>
               <a:t>Second level</a:t>
             </a:r>
           </a:p>
           <a:p>
             <a:pPr lvl="2"/>
             <a:r>
-              <a:rPr lang="en-US" smtClean="0"/>
+              <a:rPr lang="en-US"/>
               <a:t>Third level</a:t>
             </a:r>
           </a:p>
           <a:p>
             <a:pPr lvl="3"/>
             <a:r>
-              <a:rPr lang="en-US" smtClean="0"/>
+              <a:rPr lang="en-US"/>
               <a:t>Fourth level</a:t>
             </a:r>
           </a:p>
           <a:p>
             <a:pPr lvl="4"/>
             <a:r>
-              <a:rPr lang="en-US" smtClean="0"/>
+              <a:rPr lang="en-US"/>
               <a:t>Fifth level</a:t>
             </a:r>
-            <a:endParaRPr lang="en-US"/>
           </a:p>
         </p:txBody>
       </p:sp>
@@ -1241,7 +1229,7 @@
           <a:p>
             <a:fld id="{79CD65FD-E9A0-4CA5-8F11-E99658C14B86}" type="datetimeFigureOut">
               <a:rPr lang="en-US" smtClean="0"/>
-              <a:t>9/29/2019</a:t>
+              <a:t>11/3/20</a:t>
             </a:fld>
             <a:endParaRPr lang="en-US"/>
           </a:p>
@@ -1340,10 +1328,9 @@
           <a:lstStyle/>
           <a:p>
             <a:r>
-              <a:rPr lang="en-US" smtClean="0"/>
+              <a:rPr lang="en-US"/>
               <a:t>Click to edit Master title style</a:t>
             </a:r>
-            <a:endParaRPr lang="en-US"/>
           </a:p>
         </p:txBody>
       </p:sp>
@@ -1406,7 +1393,7 @@
           <a:p>
             <a:pPr lvl="0"/>
             <a:r>
-              <a:rPr lang="en-US" smtClean="0"/>
+              <a:rPr lang="en-US"/>
               <a:t>Edit Master text styles</a:t>
             </a:r>
           </a:p>
@@ -1434,38 +1421,37 @@
           <a:p>
             <a:pPr lvl="0"/>
             <a:r>
-              <a:rPr lang="en-US" smtClean="0"/>
+              <a:rPr lang="en-US"/>
               <a:t>Edit Master text styles</a:t>
             </a:r>
           </a:p>
           <a:p>
             <a:pPr lvl="1"/>
             <a:r>
-              <a:rPr lang="en-US" smtClean="0"/>
+              <a:rPr lang="en-US"/>
               <a:t>Second level</a:t>
             </a:r>
           </a:p>
           <a:p>
             <a:pPr lvl="2"/>
             <a:r>
-              <a:rPr lang="en-US" smtClean="0"/>
+              <a:rPr lang="en-US"/>
               <a:t>Third level</a:t>
             </a:r>
           </a:p>
           <a:p>
             <a:pPr lvl="3"/>
             <a:r>
-              <a:rPr lang="en-US" smtClean="0"/>
+              <a:rPr lang="en-US"/>
               <a:t>Fourth level</a:t>
             </a:r>
           </a:p>
           <a:p>
             <a:pPr lvl="4"/>
             <a:r>
-              <a:rPr lang="en-US" smtClean="0"/>
+              <a:rPr lang="en-US"/>
               <a:t>Fifth level</a:t>
             </a:r>
-            <a:endParaRPr lang="en-US"/>
           </a:p>
         </p:txBody>
       </p:sp>
@@ -1528,7 +1514,7 @@
           <a:p>
             <a:pPr lvl="0"/>
             <a:r>
-              <a:rPr lang="en-US" smtClean="0"/>
+              <a:rPr lang="en-US"/>
               <a:t>Edit Master text styles</a:t>
             </a:r>
           </a:p>
@@ -1556,38 +1542,37 @@
           <a:p>
             <a:pPr lvl="0"/>
             <a:r>
-              <a:rPr lang="en-US" smtClean="0"/>
+              <a:rPr lang="en-US"/>
               <a:t>Edit Master text styles</a:t>
             </a:r>
           </a:p>
           <a:p>
             <a:pPr lvl="1"/>
             <a:r>
-              <a:rPr lang="en-US" smtClean="0"/>
+              <a:rPr lang="en-US"/>
               <a:t>Second level</a:t>
             </a:r>
           </a:p>
           <a:p>
             <a:pPr lvl="2"/>
             <a:r>
-              <a:rPr lang="en-US" smtClean="0"/>
+              <a:rPr lang="en-US"/>
               <a:t>Third level</a:t>
             </a:r>
           </a:p>
           <a:p>
             <a:pPr lvl="3"/>
             <a:r>
-              <a:rPr lang="en-US" smtClean="0"/>
+              <a:rPr lang="en-US"/>
               <a:t>Fourth level</a:t>
             </a:r>
           </a:p>
           <a:p>
             <a:pPr lvl="4"/>
             <a:r>
-              <a:rPr lang="en-US" smtClean="0"/>
+              <a:rPr lang="en-US"/>
               <a:t>Fifth level</a:t>
             </a:r>
-            <a:endParaRPr lang="en-US"/>
           </a:p>
         </p:txBody>
       </p:sp>
@@ -1608,7 +1593,7 @@
           <a:p>
             <a:fld id="{79CD65FD-E9A0-4CA5-8F11-E99658C14B86}" type="datetimeFigureOut">
               <a:rPr lang="en-US" smtClean="0"/>
-              <a:t>9/29/2019</a:t>
+              <a:t>11/3/20</a:t>
             </a:fld>
             <a:endParaRPr lang="en-US"/>
           </a:p>
@@ -1702,10 +1687,9 @@
           <a:lstStyle/>
           <a:p>
             <a:r>
-              <a:rPr lang="en-US" smtClean="0"/>
+              <a:rPr lang="en-US"/>
               <a:t>Click to edit Master title style</a:t>
             </a:r>
-            <a:endParaRPr lang="en-US"/>
           </a:p>
         </p:txBody>
       </p:sp>
@@ -1726,7 +1710,7 @@
           <a:p>
             <a:fld id="{79CD65FD-E9A0-4CA5-8F11-E99658C14B86}" type="datetimeFigureOut">
               <a:rPr lang="en-US" smtClean="0"/>
-              <a:t>9/29/2019</a:t>
+              <a:t>11/3/20</a:t>
             </a:fld>
             <a:endParaRPr lang="en-US"/>
           </a:p>
@@ -1821,7 +1805,7 @@
           <a:p>
             <a:fld id="{79CD65FD-E9A0-4CA5-8F11-E99658C14B86}" type="datetimeFigureOut">
               <a:rPr lang="en-US" smtClean="0"/>
-              <a:t>9/29/2019</a:t>
+              <a:t>11/3/20</a:t>
             </a:fld>
             <a:endParaRPr lang="en-US"/>
           </a:p>
@@ -1924,10 +1908,9 @@
           </a:lstStyle>
           <a:p>
             <a:r>
-              <a:rPr lang="en-US" smtClean="0"/>
+              <a:rPr lang="en-US"/>
               <a:t>Click to edit Master title style</a:t>
             </a:r>
-            <a:endParaRPr lang="en-US"/>
           </a:p>
         </p:txBody>
       </p:sp>
@@ -1981,38 +1964,37 @@
           <a:p>
             <a:pPr lvl="0"/>
             <a:r>
-              <a:rPr lang="en-US" smtClean="0"/>
+              <a:rPr lang="en-US"/>
               <a:t>Edit Master text styles</a:t>
             </a:r>
           </a:p>
           <a:p>
             <a:pPr lvl="1"/>
             <a:r>
-              <a:rPr lang="en-US" smtClean="0"/>
+              <a:rPr lang="en-US"/>
               <a:t>Second level</a:t>
             </a:r>
           </a:p>
           <a:p>
             <a:pPr lvl="2"/>
             <a:r>
-              <a:rPr lang="en-US" smtClean="0"/>
+              <a:rPr lang="en-US"/>
               <a:t>Third level</a:t>
             </a:r>
           </a:p>
           <a:p>
             <a:pPr lvl="3"/>
             <a:r>
-              <a:rPr lang="en-US" smtClean="0"/>
+              <a:rPr lang="en-US"/>
               <a:t>Fourth level</a:t>
             </a:r>
           </a:p>
           <a:p>
             <a:pPr lvl="4"/>
             <a:r>
-              <a:rPr lang="en-US" smtClean="0"/>
+              <a:rPr lang="en-US"/>
               <a:t>Fifth level</a:t>
             </a:r>
-            <a:endParaRPr lang="en-US"/>
           </a:p>
         </p:txBody>
       </p:sp>
@@ -2075,7 +2057,7 @@
           <a:p>
             <a:pPr lvl="0"/>
             <a:r>
-              <a:rPr lang="en-US" smtClean="0"/>
+              <a:rPr lang="en-US"/>
               <a:t>Edit Master text styles</a:t>
             </a:r>
           </a:p>
@@ -2098,7 +2080,7 @@
           <a:p>
             <a:fld id="{79CD65FD-E9A0-4CA5-8F11-E99658C14B86}" type="datetimeFigureOut">
               <a:rPr lang="en-US" smtClean="0"/>
-              <a:t>9/29/2019</a:t>
+              <a:t>11/3/20</a:t>
             </a:fld>
             <a:endParaRPr lang="en-US"/>
           </a:p>
@@ -2201,10 +2183,9 @@
           </a:lstStyle>
           <a:p>
             <a:r>
-              <a:rPr lang="en-US" smtClean="0"/>
+              <a:rPr lang="en-US"/>
               <a:t>Click to edit Master title style</a:t>
             </a:r>
-            <a:endParaRPr lang="en-US"/>
           </a:p>
         </p:txBody>
       </p:sp>
@@ -2328,7 +2309,7 @@
           <a:p>
             <a:pPr lvl="0"/>
             <a:r>
-              <a:rPr lang="en-US" smtClean="0"/>
+              <a:rPr lang="en-US"/>
               <a:t>Edit Master text styles</a:t>
             </a:r>
           </a:p>
@@ -2351,7 +2332,7 @@
           <a:p>
             <a:fld id="{79CD65FD-E9A0-4CA5-8F11-E99658C14B86}" type="datetimeFigureOut">
               <a:rPr lang="en-US" smtClean="0"/>
-              <a:t>9/29/2019</a:t>
+              <a:t>11/3/20</a:t>
             </a:fld>
             <a:endParaRPr lang="en-US"/>
           </a:p>
@@ -2460,10 +2441,9 @@
           <a:lstStyle/>
           <a:p>
             <a:r>
-              <a:rPr lang="en-US" smtClean="0"/>
+              <a:rPr lang="en-US"/>
               <a:t>Click to edit Master title style</a:t>
             </a:r>
-            <a:endParaRPr lang="en-US"/>
           </a:p>
         </p:txBody>
       </p:sp>
@@ -2494,38 +2474,37 @@
           <a:p>
             <a:pPr lvl="0"/>
             <a:r>
-              <a:rPr lang="en-US" smtClean="0"/>
+              <a:rPr lang="en-US"/>
               <a:t>Edit Master text styles</a:t>
             </a:r>
           </a:p>
           <a:p>
             <a:pPr lvl="1"/>
             <a:r>
-              <a:rPr lang="en-US" smtClean="0"/>
+              <a:rPr lang="en-US"/>
               <a:t>Second level</a:t>
             </a:r>
           </a:p>
           <a:p>
             <a:pPr lvl="2"/>
             <a:r>
-              <a:rPr lang="en-US" smtClean="0"/>
+              <a:rPr lang="en-US"/>
               <a:t>Third level</a:t>
             </a:r>
           </a:p>
           <a:p>
             <a:pPr lvl="3"/>
             <a:r>
-              <a:rPr lang="en-US" smtClean="0"/>
+              <a:rPr lang="en-US"/>
               <a:t>Fourth level</a:t>
             </a:r>
           </a:p>
           <a:p>
             <a:pPr lvl="4"/>
             <a:r>
-              <a:rPr lang="en-US" smtClean="0"/>
+              <a:rPr lang="en-US"/>
               <a:t>Fifth level</a:t>
             </a:r>
-            <a:endParaRPr lang="en-US"/>
           </a:p>
         </p:txBody>
       </p:sp>
@@ -2564,7 +2543,7 @@
           <a:p>
             <a:fld id="{79CD65FD-E9A0-4CA5-8F11-E99658C14B86}" type="datetimeFigureOut">
               <a:rPr lang="en-US" smtClean="0"/>
-              <a:t>9/29/2019</a:t>
+              <a:t>11/3/20</a:t>
             </a:fld>
             <a:endParaRPr lang="en-US"/>
           </a:p>
@@ -3001,31 +2980,28 @@
           <a:p>
             <a:pPr algn="ctr"/>
             <a:r>
-              <a:rPr lang="en-US" sz="1200" dirty="0" smtClean="0">
+              <a:rPr lang="en-US" sz="1200" dirty="0">
                 <a:solidFill>
                   <a:schemeClr val="bg1"/>
                 </a:solidFill>
               </a:rPr>
               <a:t>financial_transactions</a:t>
             </a:r>
-            <a:endParaRPr lang="en-US" sz="1200" dirty="0">
-              <a:solidFill>
-                <a:schemeClr val="bg1"/>
-              </a:solidFill>
-            </a:endParaRPr>
           </a:p>
         </p:txBody>
       </p:sp>
       <p:cxnSp>
         <p:nvCxnSpPr>
           <p:cNvPr id="45" name="Straight Arrow Connector 44"/>
-          <p:cNvCxnSpPr/>
+          <p:cNvCxnSpPr>
+            <a:cxnSpLocks/>
+          </p:cNvCxnSpPr>
           <p:nvPr/>
         </p:nvCxnSpPr>
         <p:spPr>
           <a:xfrm>
-            <a:off x="5611158" y="2379926"/>
-            <a:ext cx="323184" cy="672348"/>
+            <a:off x="5675567" y="2526827"/>
+            <a:ext cx="316839" cy="680147"/>
           </a:xfrm>
           <a:prstGeom prst="straightConnector1">
             <a:avLst/>
@@ -3034,7 +3010,8 @@
             <a:solidFill>
               <a:srgbClr val="41817E"/>
             </a:solidFill>
-            <a:tailEnd type="triangle" w="med" len="sm"/>
+            <a:headEnd type="triangle"/>
+            <a:tailEnd type="none" w="med" len="sm"/>
           </a:ln>
         </p:spPr>
         <p:style>
@@ -3073,7 +3050,8 @@
             <a:solidFill>
               <a:srgbClr val="41817E"/>
             </a:solidFill>
-            <a:tailEnd type="triangle" w="med" len="sm"/>
+            <a:headEnd type="triangle"/>
+            <a:tailEnd type="none" w="med" len="sm"/>
           </a:ln>
         </p:spPr>
         <p:style>
@@ -3139,18 +3117,13 @@
           <a:p>
             <a:pPr algn="ctr"/>
             <a:r>
-              <a:rPr lang="en-US" sz="800" dirty="0" smtClean="0">
+              <a:rPr lang="en-US" sz="800" dirty="0">
                 <a:solidFill>
                   <a:srgbClr val="312D2A"/>
                 </a:solidFill>
               </a:rPr>
               <a:t>Account</a:t>
             </a:r>
-            <a:endParaRPr lang="en-US" sz="800" dirty="0">
-              <a:solidFill>
-                <a:srgbClr val="312D2A"/>
-              </a:solidFill>
-            </a:endParaRPr>
           </a:p>
         </p:txBody>
       </p:sp>
@@ -3241,18 +3214,13 @@
           <a:p>
             <a:pPr algn="ctr"/>
             <a:r>
-              <a:rPr lang="en-US" sz="800" dirty="0" smtClean="0">
+              <a:rPr lang="en-US" sz="800" dirty="0">
                 <a:solidFill>
                   <a:srgbClr val="312D2A"/>
                 </a:solidFill>
               </a:rPr>
               <a:t>Person</a:t>
             </a:r>
-            <a:endParaRPr lang="en-US" sz="800" dirty="0">
-              <a:solidFill>
-                <a:srgbClr val="312D2A"/>
-              </a:solidFill>
-            </a:endParaRPr>
           </a:p>
         </p:txBody>
       </p:sp>
@@ -3304,18 +3272,13 @@
           <a:p>
             <a:pPr algn="ctr"/>
             <a:r>
-              <a:rPr lang="en-US" sz="800" dirty="0" smtClean="0">
+              <a:rPr lang="en-US" sz="800" dirty="0">
                 <a:solidFill>
                   <a:srgbClr val="312D2A"/>
                 </a:solidFill>
               </a:rPr>
               <a:t>Person</a:t>
             </a:r>
-            <a:endParaRPr lang="en-US" sz="800" dirty="0">
-              <a:solidFill>
-                <a:srgbClr val="312D2A"/>
-              </a:solidFill>
-            </a:endParaRPr>
           </a:p>
         </p:txBody>
       </p:sp>
@@ -3340,7 +3303,8 @@
             <a:solidFill>
               <a:srgbClr val="41817E"/>
             </a:solidFill>
-            <a:tailEnd type="triangle" w="med" len="sm"/>
+            <a:headEnd type="triangle"/>
+            <a:tailEnd type="none" w="med" len="sm"/>
           </a:ln>
         </p:spPr>
         <p:style>
@@ -3379,7 +3343,8 @@
             <a:solidFill>
               <a:srgbClr val="41817E"/>
             </a:solidFill>
-            <a:tailEnd type="triangle" w="med" len="sm"/>
+            <a:headEnd type="triangle"/>
+            <a:tailEnd type="none" w="med" len="sm"/>
           </a:ln>
         </p:spPr>
         <p:style>
@@ -3494,18 +3459,13 @@
           <a:lstStyle/>
           <a:p>
             <a:r>
-              <a:rPr lang="en-US" sz="800" dirty="0" smtClean="0">
+              <a:rPr lang="en-US" sz="800" dirty="0">
                 <a:solidFill>
                   <a:schemeClr val="bg1"/>
                 </a:solidFill>
               </a:rPr>
               <a:t>worksFor</a:t>
             </a:r>
-            <a:endParaRPr lang="en-US" sz="800" dirty="0">
-              <a:solidFill>
-                <a:schemeClr val="bg1"/>
-              </a:solidFill>
-            </a:endParaRPr>
           </a:p>
         </p:txBody>
       </p:sp>
@@ -3517,8 +3477,8 @@
         </p:nvSpPr>
         <p:spPr>
           <a:xfrm rot="3872027">
-            <a:off x="5596535" y="2696609"/>
-            <a:ext cx="405624" cy="123111"/>
+            <a:off x="5671628" y="2753759"/>
+            <a:ext cx="306238" cy="123111"/>
           </a:xfrm>
           <a:prstGeom prst="rect">
             <a:avLst/>
@@ -3534,18 +3494,13 @@
           <a:lstStyle/>
           <a:p>
             <a:r>
-              <a:rPr lang="en-US" sz="800" dirty="0" smtClean="0">
+              <a:rPr lang="en-US" sz="800" dirty="0">
                 <a:solidFill>
                   <a:schemeClr val="bg1"/>
                 </a:solidFill>
               </a:rPr>
-              <a:t>ownerOf</a:t>
-            </a:r>
-            <a:endParaRPr lang="en-US" sz="800" dirty="0">
-              <a:solidFill>
-                <a:schemeClr val="bg1"/>
-              </a:solidFill>
-            </a:endParaRPr>
+              <a:t>owner</a:t>
+            </a:r>
           </a:p>
         </p:txBody>
       </p:sp>
@@ -3557,8 +3512,8 @@
         </p:nvSpPr>
         <p:spPr>
           <a:xfrm rot="2877950">
-            <a:off x="6816728" y="2251973"/>
-            <a:ext cx="405624" cy="123111"/>
+            <a:off x="6835972" y="2208459"/>
+            <a:ext cx="306238" cy="123111"/>
           </a:xfrm>
           <a:prstGeom prst="rect">
             <a:avLst/>
@@ -3574,18 +3529,13 @@
           <a:lstStyle/>
           <a:p>
             <a:r>
-              <a:rPr lang="en-US" sz="800" dirty="0" smtClean="0">
+              <a:rPr lang="en-US" sz="800" dirty="0">
                 <a:solidFill>
                   <a:schemeClr val="bg1"/>
                 </a:solidFill>
               </a:rPr>
-              <a:t>ownerOf</a:t>
-            </a:r>
-            <a:endParaRPr lang="en-US" sz="800" dirty="0">
-              <a:solidFill>
-                <a:schemeClr val="bg1"/>
-              </a:solidFill>
-            </a:endParaRPr>
+              <a:t>owner</a:t>
+            </a:r>
           </a:p>
         </p:txBody>
       </p:sp>
@@ -3597,8 +3547,8 @@
         </p:nvSpPr>
         <p:spPr>
           <a:xfrm>
-            <a:off x="3564304" y="3145955"/>
-            <a:ext cx="405624" cy="123111"/>
+            <a:off x="3710843" y="3152305"/>
+            <a:ext cx="306238" cy="123111"/>
           </a:xfrm>
           <a:prstGeom prst="rect">
             <a:avLst/>
@@ -3614,18 +3564,13 @@
           <a:lstStyle/>
           <a:p>
             <a:r>
-              <a:rPr lang="en-US" sz="800" dirty="0" smtClean="0">
+              <a:rPr lang="en-US" sz="800" dirty="0">
                 <a:solidFill>
                   <a:schemeClr val="bg1"/>
                 </a:solidFill>
               </a:rPr>
-              <a:t>ownerOf</a:t>
-            </a:r>
-            <a:endParaRPr lang="en-US" sz="800" dirty="0">
-              <a:solidFill>
-                <a:schemeClr val="bg1"/>
-              </a:solidFill>
-            </a:endParaRPr>
+              <a:t>owner</a:t>
+            </a:r>
           </a:p>
         </p:txBody>
       </p:sp>
@@ -3637,8 +3582,8 @@
         </p:nvSpPr>
         <p:spPr>
           <a:xfrm rot="2131962">
-            <a:off x="3976256" y="2256962"/>
-            <a:ext cx="405624" cy="123111"/>
+            <a:off x="4025949" y="2256962"/>
+            <a:ext cx="306238" cy="123111"/>
           </a:xfrm>
           <a:prstGeom prst="rect">
             <a:avLst/>
@@ -3654,18 +3599,13 @@
           <a:lstStyle/>
           <a:p>
             <a:r>
-              <a:rPr lang="en-US" sz="800" dirty="0" smtClean="0">
+              <a:rPr lang="en-US" sz="800" dirty="0">
                 <a:solidFill>
                   <a:schemeClr val="bg1"/>
                 </a:solidFill>
               </a:rPr>
-              <a:t>ownerOf</a:t>
-            </a:r>
-            <a:endParaRPr lang="en-US" sz="800" dirty="0">
-              <a:solidFill>
-                <a:schemeClr val="bg1"/>
-              </a:solidFill>
-            </a:endParaRPr>
+              <a:t>owner</a:t>
+            </a:r>
           </a:p>
         </p:txBody>
       </p:sp>
@@ -3695,7 +3635,7 @@
           <a:p>
             <a:pPr algn="ctr"/>
             <a:r>
-              <a:rPr lang="en-US" sz="800" dirty="0" smtClean="0">
+              <a:rPr lang="en-US" sz="800" dirty="0">
                 <a:solidFill>
                   <a:schemeClr val="bg1"/>
                 </a:solidFill>
@@ -3735,18 +3675,13 @@
           <a:lstStyle/>
           <a:p>
             <a:r>
-              <a:rPr lang="en-US" sz="800" dirty="0" smtClean="0">
+              <a:rPr lang="en-US" sz="800" dirty="0">
                 <a:solidFill>
                   <a:schemeClr val="bg1"/>
                 </a:solidFill>
               </a:rPr>
               <a:t>transaction</a:t>
             </a:r>
-            <a:endParaRPr lang="en-US" sz="800" dirty="0">
-              <a:solidFill>
-                <a:schemeClr val="bg1"/>
-              </a:solidFill>
-            </a:endParaRPr>
           </a:p>
         </p:txBody>
       </p:sp>
@@ -3774,7 +3709,7 @@
           <a:p>
             <a:pPr algn="ctr"/>
             <a:r>
-              <a:rPr lang="en-US" sz="800" dirty="0" smtClean="0">
+              <a:rPr lang="en-US" sz="800" dirty="0">
                 <a:solidFill>
                   <a:schemeClr val="bg1"/>
                 </a:solidFill>
@@ -3787,21 +3722,8 @@
                   <a:schemeClr val="bg1"/>
                 </a:solidFill>
               </a:rPr>
-              <a:t>$</a:t>
-            </a:r>
-            <a:r>
-              <a:rPr lang="en-US" sz="800" b="1" dirty="0" smtClean="0">
-                <a:solidFill>
-                  <a:schemeClr val="bg1"/>
-                </a:solidFill>
-              </a:rPr>
-              <a:t>9900.00</a:t>
-            </a:r>
-            <a:endParaRPr lang="en-US" sz="800" b="1" dirty="0">
-              <a:solidFill>
-                <a:schemeClr val="bg1"/>
-              </a:solidFill>
-            </a:endParaRPr>
+              <a:t>$9900.00</a:t>
+            </a:r>
           </a:p>
         </p:txBody>
       </p:sp>
@@ -3889,18 +3811,13 @@
           <a:p>
             <a:pPr algn="ctr"/>
             <a:r>
-              <a:rPr lang="en-US" sz="800" dirty="0" smtClean="0">
+              <a:rPr lang="en-US" sz="800" dirty="0">
                 <a:solidFill>
                   <a:srgbClr val="312D2A"/>
                 </a:solidFill>
               </a:rPr>
               <a:t>Account</a:t>
             </a:r>
-            <a:endParaRPr lang="en-US" sz="800" dirty="0">
-              <a:solidFill>
-                <a:srgbClr val="312D2A"/>
-              </a:solidFill>
-            </a:endParaRPr>
           </a:p>
         </p:txBody>
       </p:sp>
@@ -3930,7 +3847,7 @@
           <a:p>
             <a:pPr algn="ctr"/>
             <a:r>
-              <a:rPr lang="en-US" sz="800" dirty="0" smtClean="0">
+              <a:rPr lang="en-US" sz="800" dirty="0">
                 <a:solidFill>
                   <a:schemeClr val="bg1"/>
                 </a:solidFill>
@@ -3969,7 +3886,7 @@
           <a:p>
             <a:pPr algn="ctr"/>
             <a:r>
-              <a:rPr lang="en-US" sz="800" dirty="0" smtClean="0">
+              <a:rPr lang="en-US" sz="800" dirty="0">
                 <a:solidFill>
                   <a:schemeClr val="bg1"/>
                 </a:solidFill>
@@ -3977,18 +3894,13 @@
               <a:t>amount: </a:t>
             </a:r>
             <a:r>
-              <a:rPr lang="en-US" sz="800" b="1" dirty="0" smtClean="0">
+              <a:rPr lang="en-US" sz="800" b="1" dirty="0">
                 <a:solidFill>
                   <a:schemeClr val="bg1"/>
                 </a:solidFill>
               </a:rPr>
               <a:t>$1000.00</a:t>
             </a:r>
-            <a:endParaRPr lang="en-US" sz="800" b="1" dirty="0">
-              <a:solidFill>
-                <a:schemeClr val="bg1"/>
-              </a:solidFill>
-            </a:endParaRPr>
           </a:p>
         </p:txBody>
       </p:sp>
@@ -4016,7 +3928,7 @@
           <a:p>
             <a:pPr algn="ctr"/>
             <a:r>
-              <a:rPr lang="en-US" sz="800" dirty="0" smtClean="0">
+              <a:rPr lang="en-US" sz="800" dirty="0">
                 <a:solidFill>
                   <a:schemeClr val="bg1"/>
                 </a:solidFill>
@@ -4024,25 +3936,20 @@
               <a:t>name:</a:t>
             </a:r>
             <a:br>
-              <a:rPr lang="en-US" sz="800" dirty="0" smtClean="0">
+              <a:rPr lang="en-US" sz="800" dirty="0">
                 <a:solidFill>
                   <a:schemeClr val="bg1"/>
                 </a:solidFill>
               </a:rPr>
             </a:br>
             <a:r>
-              <a:rPr lang="en-US" sz="800" b="1" dirty="0" smtClean="0">
+              <a:rPr lang="en-US" sz="800" b="1" dirty="0">
                 <a:solidFill>
                   <a:schemeClr val="bg1"/>
                 </a:solidFill>
               </a:rPr>
               <a:t>Oracle</a:t>
             </a:r>
-            <a:endParaRPr lang="en-US" sz="800" b="1" dirty="0">
-              <a:solidFill>
-                <a:schemeClr val="bg1"/>
-              </a:solidFill>
-            </a:endParaRPr>
           </a:p>
         </p:txBody>
       </p:sp>
@@ -4070,7 +3977,7 @@
           <a:p>
             <a:pPr algn="ctr"/>
             <a:r>
-              <a:rPr lang="en-US" sz="800" dirty="0" smtClean="0">
+              <a:rPr lang="en-US" sz="800" dirty="0">
                 <a:solidFill>
                   <a:schemeClr val="bg1"/>
                 </a:solidFill>
@@ -4078,25 +3985,20 @@
               <a:t>name:</a:t>
             </a:r>
             <a:br>
-              <a:rPr lang="en-US" sz="800" dirty="0" smtClean="0">
+              <a:rPr lang="en-US" sz="800" dirty="0">
                 <a:solidFill>
                   <a:schemeClr val="bg1"/>
                 </a:solidFill>
               </a:rPr>
             </a:br>
             <a:r>
-              <a:rPr lang="en-US" sz="800" b="1" dirty="0" smtClean="0">
+              <a:rPr lang="en-US" sz="800" b="1" dirty="0">
                 <a:solidFill>
                   <a:schemeClr val="bg1"/>
                 </a:solidFill>
               </a:rPr>
               <a:t>Liam</a:t>
             </a:r>
-            <a:endParaRPr lang="en-US" sz="800" b="1" dirty="0">
-              <a:solidFill>
-                <a:schemeClr val="bg1"/>
-              </a:solidFill>
-            </a:endParaRPr>
           </a:p>
         </p:txBody>
       </p:sp>
@@ -4124,7 +4026,7 @@
           <a:p>
             <a:pPr algn="ctr"/>
             <a:r>
-              <a:rPr lang="en-US" sz="800" dirty="0" smtClean="0">
+              <a:rPr lang="en-US" sz="800" dirty="0">
                 <a:solidFill>
                   <a:schemeClr val="bg1"/>
                 </a:solidFill>
@@ -4132,25 +4034,20 @@
               <a:t>name:</a:t>
             </a:r>
             <a:br>
-              <a:rPr lang="en-US" sz="800" dirty="0" smtClean="0">
+              <a:rPr lang="en-US" sz="800" dirty="0">
                 <a:solidFill>
                   <a:schemeClr val="bg1"/>
                 </a:solidFill>
               </a:rPr>
             </a:br>
             <a:r>
-              <a:rPr lang="en-US" sz="800" b="1" dirty="0" smtClean="0">
+              <a:rPr lang="en-US" sz="800" b="1" dirty="0">
                 <a:solidFill>
                   <a:schemeClr val="bg1"/>
                 </a:solidFill>
               </a:rPr>
               <a:t>Nikita</a:t>
             </a:r>
-            <a:endParaRPr lang="en-US" sz="800" b="1" dirty="0">
-              <a:solidFill>
-                <a:schemeClr val="bg1"/>
-              </a:solidFill>
-            </a:endParaRPr>
           </a:p>
         </p:txBody>
       </p:sp>
@@ -4178,7 +4075,7 @@
           <a:p>
             <a:pPr algn="ctr"/>
             <a:r>
-              <a:rPr lang="en-US" sz="800" dirty="0" smtClean="0">
+              <a:rPr lang="en-US" sz="800" dirty="0">
                 <a:solidFill>
                   <a:schemeClr val="bg1"/>
                 </a:solidFill>
@@ -4186,25 +4083,20 @@
               <a:t>name:</a:t>
             </a:r>
             <a:br>
-              <a:rPr lang="en-US" sz="800" dirty="0" smtClean="0">
+              <a:rPr lang="en-US" sz="800" dirty="0">
                 <a:solidFill>
                   <a:schemeClr val="bg1"/>
                 </a:solidFill>
               </a:rPr>
             </a:br>
             <a:r>
-              <a:rPr lang="en-US" sz="800" b="1" dirty="0" smtClean="0">
+              <a:rPr lang="en-US" sz="800" b="1" dirty="0">
                 <a:solidFill>
                   <a:schemeClr val="bg1"/>
                 </a:solidFill>
               </a:rPr>
               <a:t>Camille</a:t>
             </a:r>
-            <a:endParaRPr lang="en-US" sz="800" b="1" dirty="0">
-              <a:solidFill>
-                <a:schemeClr val="bg1"/>
-              </a:solidFill>
-            </a:endParaRPr>
           </a:p>
         </p:txBody>
       </p:sp>
@@ -4256,18 +4148,13 @@
           <a:p>
             <a:pPr algn="ctr"/>
             <a:r>
-              <a:rPr lang="en-US" sz="800" dirty="0" smtClean="0">
+              <a:rPr lang="en-US" sz="800" dirty="0">
                 <a:solidFill>
                   <a:srgbClr val="312D2A"/>
                 </a:solidFill>
               </a:rPr>
               <a:t>Person</a:t>
             </a:r>
-            <a:endParaRPr lang="en-US" sz="800" dirty="0">
-              <a:solidFill>
-                <a:srgbClr val="312D2A"/>
-              </a:solidFill>
-            </a:endParaRPr>
           </a:p>
         </p:txBody>
       </p:sp>
@@ -4314,18 +4201,13 @@
           <a:p>
             <a:pPr algn="ctr"/>
             <a:r>
-              <a:rPr lang="en-US" sz="800" dirty="0" smtClean="0">
+              <a:rPr lang="en-US" sz="800" dirty="0">
                 <a:solidFill>
                   <a:srgbClr val="312D2A"/>
                 </a:solidFill>
               </a:rPr>
               <a:t>Company</a:t>
             </a:r>
-            <a:endParaRPr lang="en-US" sz="800" dirty="0">
-              <a:solidFill>
-                <a:srgbClr val="312D2A"/>
-              </a:solidFill>
-            </a:endParaRPr>
           </a:p>
         </p:txBody>
       </p:sp>
@@ -4353,7 +4235,7 @@
           <a:p>
             <a:pPr algn="ctr"/>
             <a:r>
-              <a:rPr lang="en-US" sz="800" dirty="0" smtClean="0">
+              <a:rPr lang="en-US" sz="800" dirty="0">
                 <a:solidFill>
                   <a:schemeClr val="bg1"/>
                 </a:solidFill>
@@ -4361,18 +4243,13 @@
               <a:t>number: </a:t>
             </a:r>
             <a:r>
-              <a:rPr lang="en-US" sz="800" b="1" dirty="0" smtClean="0">
+              <a:rPr lang="en-US" sz="800" b="1" dirty="0">
                 <a:solidFill>
                   <a:schemeClr val="bg1"/>
                 </a:solidFill>
               </a:rPr>
               <a:t>2090</a:t>
             </a:r>
-            <a:endParaRPr lang="en-US" sz="800" b="1" dirty="0">
-              <a:solidFill>
-                <a:schemeClr val="bg1"/>
-              </a:solidFill>
-            </a:endParaRPr>
           </a:p>
         </p:txBody>
       </p:sp>
@@ -4400,7 +4277,7 @@
           <a:p>
             <a:pPr algn="ctr"/>
             <a:r>
-              <a:rPr lang="en-US" sz="800" dirty="0" smtClean="0">
+              <a:rPr lang="en-US" sz="800" dirty="0">
                 <a:solidFill>
                   <a:schemeClr val="bg1"/>
                 </a:solidFill>
@@ -4408,18 +4285,13 @@
               <a:t>number: </a:t>
             </a:r>
             <a:r>
-              <a:rPr lang="en-US" sz="800" b="1" dirty="0" smtClean="0">
+              <a:rPr lang="en-US" sz="800" b="1" dirty="0">
                 <a:solidFill>
                   <a:schemeClr val="bg1"/>
                 </a:solidFill>
               </a:rPr>
               <a:t>10039</a:t>
             </a:r>
-            <a:endParaRPr lang="en-US" sz="800" b="1" dirty="0">
-              <a:solidFill>
-                <a:schemeClr val="bg1"/>
-              </a:solidFill>
-            </a:endParaRPr>
           </a:p>
         </p:txBody>
       </p:sp>
@@ -4447,7 +4319,7 @@
           <a:p>
             <a:pPr algn="ctr"/>
             <a:r>
-              <a:rPr lang="en-US" sz="800" dirty="0" smtClean="0">
+              <a:rPr lang="en-US" sz="800" dirty="0">
                 <a:solidFill>
                   <a:schemeClr val="bg1"/>
                 </a:solidFill>
@@ -4455,18 +4327,13 @@
               <a:t>number: </a:t>
             </a:r>
             <a:r>
-              <a:rPr lang="en-US" sz="800" b="1" dirty="0" smtClean="0">
+              <a:rPr lang="en-US" sz="800" b="1" dirty="0">
                 <a:solidFill>
                   <a:schemeClr val="bg1"/>
                 </a:solidFill>
               </a:rPr>
               <a:t>8021</a:t>
             </a:r>
-            <a:endParaRPr lang="en-US" sz="800" b="1" dirty="0">
-              <a:solidFill>
-                <a:schemeClr val="bg1"/>
-              </a:solidFill>
-            </a:endParaRPr>
           </a:p>
         </p:txBody>
       </p:sp>
@@ -4494,7 +4361,7 @@
           <a:p>
             <a:pPr algn="ctr"/>
             <a:r>
-              <a:rPr lang="en-US" sz="800" dirty="0" smtClean="0">
+              <a:rPr lang="en-US" sz="800" dirty="0">
                 <a:solidFill>
                   <a:schemeClr val="bg1"/>
                 </a:solidFill>
@@ -4502,18 +4369,13 @@
               <a:t>number: </a:t>
             </a:r>
             <a:r>
-              <a:rPr lang="en-US" sz="800" b="1" dirty="0" smtClean="0">
+              <a:rPr lang="en-US" sz="800" b="1" dirty="0">
                 <a:solidFill>
                   <a:schemeClr val="bg1"/>
                 </a:solidFill>
               </a:rPr>
               <a:t>1001</a:t>
             </a:r>
-            <a:endParaRPr lang="en-US" sz="800" b="1" dirty="0">
-              <a:solidFill>
-                <a:schemeClr val="bg1"/>
-              </a:solidFill>
-            </a:endParaRPr>
           </a:p>
         </p:txBody>
       </p:sp>
@@ -4579,7 +4441,7 @@
           <a:p>
             <a:pPr algn="ctr"/>
             <a:r>
-              <a:rPr lang="en-US" sz="800" dirty="0" smtClean="0">
+              <a:rPr lang="en-US" sz="800" dirty="0">
                 <a:solidFill>
                   <a:schemeClr val="bg1"/>
                 </a:solidFill>
@@ -4678,18 +4540,13 @@
           <a:p>
             <a:pPr algn="ctr"/>
             <a:r>
-              <a:rPr lang="en-US" sz="800" dirty="0" smtClean="0">
+              <a:rPr lang="en-US" sz="800" dirty="0">
                 <a:solidFill>
                   <a:srgbClr val="312D2A"/>
                 </a:solidFill>
               </a:rPr>
               <a:t>Account</a:t>
             </a:r>
-            <a:endParaRPr lang="en-US" sz="800" dirty="0">
-              <a:solidFill>
-                <a:srgbClr val="312D2A"/>
-              </a:solidFill>
-            </a:endParaRPr>
           </a:p>
         </p:txBody>
       </p:sp>
@@ -4719,7 +4576,7 @@
           <a:p>
             <a:pPr algn="ctr"/>
             <a:r>
-              <a:rPr lang="en-US" sz="800" dirty="0" smtClean="0">
+              <a:rPr lang="en-US" sz="800" dirty="0">
                 <a:solidFill>
                   <a:schemeClr val="bg1"/>
                 </a:solidFill>
@@ -4758,7 +4615,7 @@
           <a:p>
             <a:pPr algn="ctr"/>
             <a:r>
-              <a:rPr lang="en-US" sz="800" dirty="0" smtClean="0">
+              <a:rPr lang="en-US" sz="800" dirty="0">
                 <a:solidFill>
                   <a:schemeClr val="bg1"/>
                 </a:solidFill>
@@ -4766,18 +4623,13 @@
               <a:t>amount: </a:t>
             </a:r>
             <a:r>
-              <a:rPr lang="en-US" sz="800" b="1" dirty="0" smtClean="0">
+              <a:rPr lang="en-US" sz="800" b="1" dirty="0">
                 <a:solidFill>
                   <a:schemeClr val="bg1"/>
                 </a:solidFill>
               </a:rPr>
               <a:t>$3000.70</a:t>
             </a:r>
-            <a:endParaRPr lang="en-US" sz="800" b="1" dirty="0">
-              <a:solidFill>
-                <a:schemeClr val="bg1"/>
-              </a:solidFill>
-            </a:endParaRPr>
           </a:p>
         </p:txBody>
       </p:sp>
@@ -4829,18 +4681,13 @@
           <a:p>
             <a:pPr algn="ctr"/>
             <a:r>
-              <a:rPr lang="en-US" sz="800" dirty="0" smtClean="0">
+              <a:rPr lang="en-US" sz="800" dirty="0">
                 <a:solidFill>
                   <a:srgbClr val="312D2A"/>
                 </a:solidFill>
               </a:rPr>
               <a:t>Account</a:t>
             </a:r>
-            <a:endParaRPr lang="en-US" sz="800" dirty="0">
-              <a:solidFill>
-                <a:srgbClr val="312D2A"/>
-              </a:solidFill>
-            </a:endParaRPr>
           </a:p>
         </p:txBody>
       </p:sp>
@@ -4868,7 +4715,7 @@
           <a:p>
             <a:pPr algn="ctr"/>
             <a:r>
-              <a:rPr lang="en-US" sz="800" dirty="0" smtClean="0">
+              <a:rPr lang="en-US" sz="800" dirty="0">
                 <a:solidFill>
                   <a:schemeClr val="bg1"/>
                 </a:solidFill>
@@ -4876,18 +4723,13 @@
               <a:t>amount: </a:t>
             </a:r>
             <a:r>
-              <a:rPr lang="en-US" sz="800" b="1" dirty="0" smtClean="0">
+              <a:rPr lang="en-US" sz="800" b="1" dirty="0">
                 <a:solidFill>
                   <a:schemeClr val="bg1"/>
                 </a:solidFill>
               </a:rPr>
               <a:t>$1500.30</a:t>
             </a:r>
-            <a:endParaRPr lang="en-US" sz="800" b="1" dirty="0">
-              <a:solidFill>
-                <a:schemeClr val="bg1"/>
-              </a:solidFill>
-            </a:endParaRPr>
           </a:p>
         </p:txBody>
       </p:sp>
@@ -4919,29 +4761,55 @@
                   <a:schemeClr val="bg1"/>
                 </a:solidFill>
               </a:rPr>
-              <a:t>a</a:t>
-            </a:r>
-            <a:r>
-              <a:rPr lang="en-US" sz="800" dirty="0" smtClean="0">
-                <a:solidFill>
-                  <a:schemeClr val="bg1"/>
-                </a:solidFill>
-              </a:rPr>
-              <a:t>mount: </a:t>
-            </a:r>
-            <a:r>
-              <a:rPr lang="en-US" sz="800" b="1" dirty="0" smtClean="0">
+              <a:t>amount: </a:t>
+            </a:r>
+            <a:r>
+              <a:rPr lang="en-US" sz="800" b="1" dirty="0">
                 <a:solidFill>
                   <a:schemeClr val="bg1"/>
                 </a:solidFill>
               </a:rPr>
               <a:t>$9999.50</a:t>
             </a:r>
-            <a:endParaRPr lang="en-US" sz="800" b="1" dirty="0">
-              <a:solidFill>
-                <a:schemeClr val="bg1"/>
-              </a:solidFill>
-            </a:endParaRPr>
+          </a:p>
+        </p:txBody>
+      </p:sp>
+      <p:sp>
+        <p:nvSpPr>
+          <p:cNvPr id="44" name="TextBox 43">
+            <a:extLst>
+              <a:ext uri="{FF2B5EF4-FFF2-40B4-BE49-F238E27FC236}">
+                <a16:creationId xmlns:a16="http://schemas.microsoft.com/office/drawing/2014/main" id="{C62D29D5-6640-164B-85B2-1F5E20B30EC4}"/>
+              </a:ext>
+            </a:extLst>
+          </p:cNvPr>
+          <p:cNvSpPr txBox="1"/>
+          <p:nvPr/>
+        </p:nvSpPr>
+        <p:spPr>
+          <a:xfrm>
+            <a:off x="1280160" y="859536"/>
+            <a:ext cx="3810530" cy="369332"/>
+          </a:xfrm>
+          <a:prstGeom prst="rect">
+            <a:avLst/>
+          </a:prstGeom>
+          <a:noFill/>
+        </p:spPr>
+        <p:txBody>
+          <a:bodyPr wrap="none" rtlCol="0">
+            <a:spAutoFit/>
+          </a:bodyPr>
+          <a:lstStyle/>
+          <a:p>
+            <a:r>
+              <a:rPr lang="en-US" dirty="0">
+                <a:solidFill>
+                  <a:srgbClr val="FFFF00"/>
+                </a:solidFill>
+              </a:rPr>
+              <a:t>zoom to 200% then make a screenshot</a:t>
+            </a:r>
           </a:p>
         </p:txBody>
       </p:sp>

</xml_diff>